<commit_message>
updates and final presentation
</commit_message>
<xml_diff>
--- a/docs/Mining NIH Grant Data.pptx
+++ b/docs/Mining NIH Grant Data.pptx
@@ -2,23 +2,24 @@
 <file path=ppt/presentation.xml><?xml version="1.0" encoding="utf-8"?>
 <p:presentation xmlns:a="http://schemas.openxmlformats.org/drawingml/2006/main" xmlns:r="http://schemas.openxmlformats.org/officeDocument/2006/relationships" xmlns:p="http://schemas.openxmlformats.org/presentationml/2006/main" saveSubsetFonts="1">
   <p:sldMasterIdLst>
-    <p:sldMasterId id="2147483648" r:id="rId1"/>
+    <p:sldMasterId id="2147483660" r:id="rId1"/>
   </p:sldMasterIdLst>
   <p:sldIdLst>
     <p:sldId id="256" r:id="rId2"/>
-    <p:sldId id="257" r:id="rId3"/>
-    <p:sldId id="258" r:id="rId4"/>
-    <p:sldId id="259" r:id="rId5"/>
-    <p:sldId id="269" r:id="rId6"/>
-    <p:sldId id="270" r:id="rId7"/>
-    <p:sldId id="271" r:id="rId8"/>
-    <p:sldId id="272" r:id="rId9"/>
-    <p:sldId id="277" r:id="rId10"/>
-    <p:sldId id="265" r:id="rId11"/>
-    <p:sldId id="267" r:id="rId12"/>
-    <p:sldId id="278" r:id="rId13"/>
-    <p:sldId id="279" r:id="rId14"/>
-    <p:sldId id="268" r:id="rId15"/>
+    <p:sldId id="280" r:id="rId3"/>
+    <p:sldId id="257" r:id="rId4"/>
+    <p:sldId id="258" r:id="rId5"/>
+    <p:sldId id="259" r:id="rId6"/>
+    <p:sldId id="269" r:id="rId7"/>
+    <p:sldId id="270" r:id="rId8"/>
+    <p:sldId id="271" r:id="rId9"/>
+    <p:sldId id="272" r:id="rId10"/>
+    <p:sldId id="277" r:id="rId11"/>
+    <p:sldId id="265" r:id="rId12"/>
+    <p:sldId id="267" r:id="rId13"/>
+    <p:sldId id="278" r:id="rId14"/>
+    <p:sldId id="279" r:id="rId15"/>
+    <p:sldId id="268" r:id="rId16"/>
   </p:sldIdLst>
   <p:sldSz cx="9144000" cy="6858000" type="screen4x3"/>
   <p:notesSz cx="6858000" cy="9144000"/>
@@ -117,12 +118,38 @@
       </a:defRPr>
     </a:lvl9pPr>
   </p:defaultTextStyle>
+  <p:extLst>
+    <p:ext uri="{EFAFB233-063F-42B5-8137-9DF3F51BA10A}">
+      <p15:sldGuideLst xmlns:p15="http://schemas.microsoft.com/office/powerpoint/2012/main">
+        <p15:guide id="1" orient="horz" pos="2160">
+          <p15:clr>
+            <a:srgbClr val="A4A3A4"/>
+          </p15:clr>
+        </p15:guide>
+        <p15:guide id="2" pos="2880">
+          <p15:clr>
+            <a:srgbClr val="A4A3A4"/>
+          </p15:clr>
+        </p15:guide>
+      </p15:sldGuideLst>
+    </p:ext>
+  </p:extLst>
 </p:presentation>
 </file>
 
 <file path=ppt/slideLayouts/slideLayout1.xml><?xml version="1.0" encoding="utf-8"?>
-<p:sldLayout xmlns:a="http://schemas.openxmlformats.org/drawingml/2006/main" xmlns:r="http://schemas.openxmlformats.org/officeDocument/2006/relationships" xmlns:p="http://schemas.openxmlformats.org/presentationml/2006/main" type="title" preserve="1">
+<p:sldLayout xmlns:a="http://schemas.openxmlformats.org/drawingml/2006/main" xmlns:r="http://schemas.openxmlformats.org/officeDocument/2006/relationships" xmlns:p="http://schemas.openxmlformats.org/presentationml/2006/main" showMasterSp="0" type="title" preserve="1">
   <p:cSld name="Title Slide">
+    <p:bg>
+      <p:bgPr>
+        <a:solidFill>
+          <a:schemeClr val="bg2">
+            <a:lumMod val="75000"/>
+          </a:schemeClr>
+        </a:solidFill>
+        <a:effectLst/>
+      </p:bgPr>
+    </p:bg>
     <p:spTree>
       <p:nvGrpSpPr>
         <p:cNvPr id="1" name=""/>
@@ -149,19 +176,32 @@
         </p:nvSpPr>
         <p:spPr>
           <a:xfrm>
-            <a:off x="685800" y="2130425"/>
-            <a:ext cx="7772400" cy="1470025"/>
+            <a:off x="946404" y="758952"/>
+            <a:ext cx="7063740" cy="4041648"/>
           </a:xfrm>
         </p:spPr>
         <p:txBody>
-          <a:bodyPr/>
-          <a:lstStyle/>
+          <a:bodyPr anchor="b">
+            <a:normAutofit/>
+          </a:bodyPr>
+          <a:lstStyle>
+            <a:lvl1pPr algn="l">
+              <a:lnSpc>
+                <a:spcPct val="85000"/>
+              </a:lnSpc>
+              <a:defRPr sz="6600" baseline="0">
+                <a:solidFill>
+                  <a:schemeClr val="tx1"/>
+                </a:solidFill>
+              </a:defRPr>
+            </a:lvl1pPr>
+          </a:lstStyle>
           <a:p>
             <a:r>
               <a:rPr lang="en-US" smtClean="0"/>
               <a:t>Click to edit Master title style</a:t>
             </a:r>
-            <a:endParaRPr lang="en-US"/>
+            <a:endParaRPr lang="en-US" dirty="0"/>
           </a:p>
         </p:txBody>
       </p:sp>
@@ -177,169 +217,194 @@
         </p:nvSpPr>
         <p:spPr>
           <a:xfrm>
-            <a:off x="1371600" y="3886200"/>
-            <a:ext cx="6400800" cy="1752600"/>
+            <a:off x="946404" y="4800600"/>
+            <a:ext cx="7063740" cy="1691640"/>
           </a:xfrm>
         </p:spPr>
         <p:txBody>
-          <a:bodyPr/>
+          <a:bodyPr>
+            <a:normAutofit/>
+          </a:bodyPr>
           <a:lstStyle>
-            <a:lvl1pPr marL="0" indent="0" algn="ctr">
-              <a:buNone/>
-              <a:defRPr>
+            <a:lvl1pPr marL="0" indent="0" algn="l">
+              <a:buNone/>
+              <a:defRPr sz="2000" baseline="0">
                 <a:solidFill>
                   <a:schemeClr val="tx1">
-                    <a:tint val="75000"/>
+                    <a:lumMod val="85000"/>
                   </a:schemeClr>
                 </a:solidFill>
               </a:defRPr>
             </a:lvl1pPr>
             <a:lvl2pPr marL="457200" indent="0" algn="ctr">
               <a:buNone/>
+              <a:defRPr sz="2000"/>
+            </a:lvl2pPr>
+            <a:lvl3pPr marL="914400" indent="0" algn="ctr">
+              <a:buNone/>
+              <a:defRPr sz="2000"/>
+            </a:lvl3pPr>
+            <a:lvl4pPr marL="1371600" indent="0" algn="ctr">
+              <a:buNone/>
+              <a:defRPr sz="2000"/>
+            </a:lvl4pPr>
+            <a:lvl5pPr marL="1828800" indent="0" algn="ctr">
+              <a:buNone/>
+              <a:defRPr sz="2000"/>
+            </a:lvl5pPr>
+            <a:lvl6pPr marL="2286000" indent="0" algn="ctr">
+              <a:buNone/>
+              <a:defRPr sz="2000"/>
+            </a:lvl6pPr>
+            <a:lvl7pPr marL="2743200" indent="0" algn="ctr">
+              <a:buNone/>
+              <a:defRPr sz="2000"/>
+            </a:lvl7pPr>
+            <a:lvl8pPr marL="3200400" indent="0" algn="ctr">
+              <a:buNone/>
+              <a:defRPr sz="2000"/>
+            </a:lvl8pPr>
+            <a:lvl9pPr marL="3657600" indent="0" algn="ctr">
+              <a:buNone/>
+              <a:defRPr sz="2000"/>
+            </a:lvl9pPr>
+          </a:lstStyle>
+          <a:p>
+            <a:r>
+              <a:rPr lang="en-US" smtClean="0"/>
+              <a:t>Click to edit Master subtitle style</a:t>
+            </a:r>
+            <a:endParaRPr lang="en-US" dirty="0"/>
+          </a:p>
+        </p:txBody>
+      </p:sp>
+      <p:sp>
+        <p:nvSpPr>
+          <p:cNvPr id="7" name="Rectangle 6"/>
+          <p:cNvSpPr/>
+          <p:nvPr/>
+        </p:nvSpPr>
+        <p:spPr>
+          <a:xfrm>
+            <a:off x="0" y="0"/>
+            <a:ext cx="342900" cy="6858000"/>
+          </a:xfrm>
+          <a:prstGeom prst="rect">
+            <a:avLst/>
+          </a:prstGeom>
+          <a:solidFill>
+            <a:schemeClr val="accent1"/>
+          </a:solidFill>
+          <a:ln>
+            <a:noFill/>
+          </a:ln>
+        </p:spPr>
+        <p:style>
+          <a:lnRef idx="2">
+            <a:schemeClr val="accent1">
+              <a:shade val="50000"/>
+            </a:schemeClr>
+          </a:lnRef>
+          <a:fillRef idx="1">
+            <a:schemeClr val="accent1"/>
+          </a:fillRef>
+          <a:effectRef idx="0">
+            <a:schemeClr val="accent1"/>
+          </a:effectRef>
+          <a:fontRef idx="minor">
+            <a:schemeClr val="lt1"/>
+          </a:fontRef>
+        </p:style>
+      </p:sp>
+      <p:sp>
+        <p:nvSpPr>
+          <p:cNvPr id="8" name="Date Placeholder 7"/>
+          <p:cNvSpPr>
+            <a:spLocks noGrp="1"/>
+          </p:cNvSpPr>
+          <p:nvPr>
+            <p:ph type="dt" sz="half" idx="10"/>
+          </p:nvPr>
+        </p:nvSpPr>
+        <p:spPr/>
+        <p:txBody>
+          <a:bodyPr/>
+          <a:lstStyle>
+            <a:lvl1pPr>
               <a:defRPr>
                 <a:solidFill>
-                  <a:schemeClr val="tx1">
-                    <a:tint val="75000"/>
+                  <a:schemeClr val="bg2">
+                    <a:lumMod val="20000"/>
+                    <a:lumOff val="80000"/>
                   </a:schemeClr>
                 </a:solidFill>
               </a:defRPr>
-            </a:lvl2pPr>
-            <a:lvl3pPr marL="914400" indent="0" algn="ctr">
-              <a:buNone/>
+            </a:lvl1pPr>
+          </a:lstStyle>
+          <a:p>
+            <a:fld id="{EF687610-B264-4EE2-9162-558FC9B97517}" type="datetimeFigureOut">
+              <a:rPr lang="en-US" smtClean="0"/>
+              <a:t>2014-05-05</a:t>
+            </a:fld>
+            <a:endParaRPr lang="en-US"/>
+          </a:p>
+        </p:txBody>
+      </p:sp>
+      <p:sp>
+        <p:nvSpPr>
+          <p:cNvPr id="9" name="Footer Placeholder 8"/>
+          <p:cNvSpPr>
+            <a:spLocks noGrp="1"/>
+          </p:cNvSpPr>
+          <p:nvPr>
+            <p:ph type="ftr" sz="quarter" idx="11"/>
+          </p:nvPr>
+        </p:nvSpPr>
+        <p:spPr/>
+        <p:txBody>
+          <a:bodyPr/>
+          <a:lstStyle>
+            <a:lvl1pPr>
               <a:defRPr>
                 <a:solidFill>
-                  <a:schemeClr val="tx1">
-                    <a:tint val="75000"/>
+                  <a:schemeClr val="bg2">
+                    <a:lumMod val="20000"/>
+                    <a:lumOff val="80000"/>
                   </a:schemeClr>
                 </a:solidFill>
               </a:defRPr>
-            </a:lvl3pPr>
-            <a:lvl4pPr marL="1371600" indent="0" algn="ctr">
-              <a:buNone/>
+            </a:lvl1pPr>
+          </a:lstStyle>
+          <a:p>
+            <a:endParaRPr lang="en-US"/>
+          </a:p>
+        </p:txBody>
+      </p:sp>
+      <p:sp>
+        <p:nvSpPr>
+          <p:cNvPr id="10" name="Slide Number Placeholder 9"/>
+          <p:cNvSpPr>
+            <a:spLocks noGrp="1"/>
+          </p:cNvSpPr>
+          <p:nvPr>
+            <p:ph type="sldNum" sz="quarter" idx="12"/>
+          </p:nvPr>
+        </p:nvSpPr>
+        <p:spPr/>
+        <p:txBody>
+          <a:bodyPr/>
+          <a:lstStyle>
+            <a:lvl1pPr>
               <a:defRPr>
                 <a:solidFill>
-                  <a:schemeClr val="tx1">
-                    <a:tint val="75000"/>
+                  <a:schemeClr val="bg2">
+                    <a:lumMod val="60000"/>
+                    <a:lumOff val="40000"/>
                   </a:schemeClr>
                 </a:solidFill>
               </a:defRPr>
-            </a:lvl4pPr>
-            <a:lvl5pPr marL="1828800" indent="0" algn="ctr">
-              <a:buNone/>
-              <a:defRPr>
-                <a:solidFill>
-                  <a:schemeClr val="tx1">
-                    <a:tint val="75000"/>
-                  </a:schemeClr>
-                </a:solidFill>
-              </a:defRPr>
-            </a:lvl5pPr>
-            <a:lvl6pPr marL="2286000" indent="0" algn="ctr">
-              <a:buNone/>
-              <a:defRPr>
-                <a:solidFill>
-                  <a:schemeClr val="tx1">
-                    <a:tint val="75000"/>
-                  </a:schemeClr>
-                </a:solidFill>
-              </a:defRPr>
-            </a:lvl6pPr>
-            <a:lvl7pPr marL="2743200" indent="0" algn="ctr">
-              <a:buNone/>
-              <a:defRPr>
-                <a:solidFill>
-                  <a:schemeClr val="tx1">
-                    <a:tint val="75000"/>
-                  </a:schemeClr>
-                </a:solidFill>
-              </a:defRPr>
-            </a:lvl7pPr>
-            <a:lvl8pPr marL="3200400" indent="0" algn="ctr">
-              <a:buNone/>
-              <a:defRPr>
-                <a:solidFill>
-                  <a:schemeClr val="tx1">
-                    <a:tint val="75000"/>
-                  </a:schemeClr>
-                </a:solidFill>
-              </a:defRPr>
-            </a:lvl8pPr>
-            <a:lvl9pPr marL="3657600" indent="0" algn="ctr">
-              <a:buNone/>
-              <a:defRPr>
-                <a:solidFill>
-                  <a:schemeClr val="tx1">
-                    <a:tint val="75000"/>
-                  </a:schemeClr>
-                </a:solidFill>
-              </a:defRPr>
-            </a:lvl9pPr>
+            </a:lvl1pPr>
           </a:lstStyle>
-          <a:p>
-            <a:r>
-              <a:rPr lang="en-US" smtClean="0"/>
-              <a:t>Click to edit Master subtitle style</a:t>
-            </a:r>
-            <a:endParaRPr lang="en-US"/>
-          </a:p>
-        </p:txBody>
-      </p:sp>
-      <p:sp>
-        <p:nvSpPr>
-          <p:cNvPr id="4" name="Date Placeholder 3"/>
-          <p:cNvSpPr>
-            <a:spLocks noGrp="1"/>
-          </p:cNvSpPr>
-          <p:nvPr>
-            <p:ph type="dt" sz="half" idx="10"/>
-          </p:nvPr>
-        </p:nvSpPr>
-        <p:spPr/>
-        <p:txBody>
-          <a:bodyPr/>
-          <a:lstStyle/>
-          <a:p>
-            <a:fld id="{EF687610-B264-4EE2-9162-558FC9B97517}" type="datetimeFigureOut">
-              <a:rPr lang="en-US" smtClean="0"/>
-              <a:t>5/5/2014</a:t>
-            </a:fld>
-            <a:endParaRPr lang="en-US"/>
-          </a:p>
-        </p:txBody>
-      </p:sp>
-      <p:sp>
-        <p:nvSpPr>
-          <p:cNvPr id="5" name="Footer Placeholder 4"/>
-          <p:cNvSpPr>
-            <a:spLocks noGrp="1"/>
-          </p:cNvSpPr>
-          <p:nvPr>
-            <p:ph type="ftr" sz="quarter" idx="11"/>
-          </p:nvPr>
-        </p:nvSpPr>
-        <p:spPr/>
-        <p:txBody>
-          <a:bodyPr/>
-          <a:lstStyle/>
-          <a:p>
-            <a:endParaRPr lang="en-US"/>
-          </a:p>
-        </p:txBody>
-      </p:sp>
-      <p:sp>
-        <p:nvSpPr>
-          <p:cNvPr id="6" name="Slide Number Placeholder 5"/>
-          <p:cNvSpPr>
-            <a:spLocks noGrp="1"/>
-          </p:cNvSpPr>
-          <p:nvPr>
-            <p:ph type="sldNum" sz="quarter" idx="12"/>
-          </p:nvPr>
-        </p:nvSpPr>
-        <p:spPr/>
-        <p:txBody>
-          <a:bodyPr/>
-          <a:lstStyle/>
           <a:p>
             <a:fld id="{03FD3641-491E-4991-93F1-1E187ED6B48C}" type="slidenum">
               <a:rPr lang="en-US" smtClean="0"/>
@@ -352,12 +417,12 @@
     </p:spTree>
     <p:extLst>
       <p:ext uri="{BB962C8B-B14F-4D97-AF65-F5344CB8AC3E}">
-        <p14:creationId xmlns:p14="http://schemas.microsoft.com/office/powerpoint/2010/main" val="3558305340"/>
+        <p14:creationId xmlns:p14="http://schemas.microsoft.com/office/powerpoint/2010/main" val="2306938280"/>
       </p:ext>
     </p:extLst>
   </p:cSld>
   <p:clrMapOvr>
-    <a:masterClrMapping/>
+    <a:overrideClrMapping bg1="dk1" tx1="lt1" bg2="dk2" tx2="lt2" accent1="accent1" accent2="accent2" accent3="accent3" accent4="accent4" accent5="accent5" accent6="accent6" hlink="hlink" folHlink="folHlink"/>
   </p:clrMapOvr>
 </p:sldLayout>
 </file>
@@ -398,7 +463,7 @@
               <a:rPr lang="en-US" smtClean="0"/>
               <a:t>Click to edit Master title style</a:t>
             </a:r>
-            <a:endParaRPr lang="en-US"/>
+            <a:endParaRPr lang="en-US" dirty="0"/>
           </a:p>
         </p:txBody>
       </p:sp>
@@ -450,7 +515,7 @@
               <a:rPr lang="en-US" smtClean="0"/>
               <a:t>Fifth level</a:t>
             </a:r>
-            <a:endParaRPr lang="en-US"/>
+            <a:endParaRPr lang="en-US" dirty="0"/>
           </a:p>
         </p:txBody>
       </p:sp>
@@ -471,7 +536,7 @@
           <a:p>
             <a:fld id="{EF687610-B264-4EE2-9162-558FC9B97517}" type="datetimeFigureOut">
               <a:rPr lang="en-US" smtClean="0"/>
-              <a:t>5/5/2014</a:t>
+              <a:t>2014-05-05</a:t>
             </a:fld>
             <a:endParaRPr lang="en-US"/>
           </a:p>
@@ -522,7 +587,7 @@
     </p:spTree>
     <p:extLst>
       <p:ext uri="{BB962C8B-B14F-4D97-AF65-F5344CB8AC3E}">
-        <p14:creationId xmlns:p14="http://schemas.microsoft.com/office/powerpoint/2010/main" val="2802712886"/>
+        <p14:creationId xmlns:p14="http://schemas.microsoft.com/office/powerpoint/2010/main" val="3988345199"/>
       </p:ext>
     </p:extLst>
   </p:cSld>
@@ -561,8 +626,8 @@
         </p:nvSpPr>
         <p:spPr>
           <a:xfrm>
-            <a:off x="6629400" y="274638"/>
-            <a:ext cx="2057400" cy="5851525"/>
+            <a:off x="6486525" y="381000"/>
+            <a:ext cx="1857375" cy="5897562"/>
           </a:xfrm>
         </p:spPr>
         <p:txBody>
@@ -573,7 +638,7 @@
               <a:rPr lang="en-US" smtClean="0"/>
               <a:t>Click to edit Master title style</a:t>
             </a:r>
-            <a:endParaRPr lang="en-US"/>
+            <a:endParaRPr lang="en-US" dirty="0"/>
           </a:p>
         </p:txBody>
       </p:sp>
@@ -589,8 +654,8 @@
         </p:nvSpPr>
         <p:spPr>
           <a:xfrm>
-            <a:off x="457200" y="274638"/>
-            <a:ext cx="6019800" cy="5851525"/>
+            <a:off x="571500" y="381000"/>
+            <a:ext cx="5800725" cy="5897562"/>
           </a:xfrm>
         </p:spPr>
         <p:txBody>
@@ -630,7 +695,7 @@
               <a:rPr lang="en-US" smtClean="0"/>
               <a:t>Fifth level</a:t>
             </a:r>
-            <a:endParaRPr lang="en-US"/>
+            <a:endParaRPr lang="en-US" dirty="0"/>
           </a:p>
         </p:txBody>
       </p:sp>
@@ -651,7 +716,7 @@
           <a:p>
             <a:fld id="{EF687610-B264-4EE2-9162-558FC9B97517}" type="datetimeFigureOut">
               <a:rPr lang="en-US" smtClean="0"/>
-              <a:t>5/5/2014</a:t>
+              <a:t>2014-05-05</a:t>
             </a:fld>
             <a:endParaRPr lang="en-US"/>
           </a:p>
@@ -702,7 +767,7 @@
     </p:spTree>
     <p:extLst>
       <p:ext uri="{BB962C8B-B14F-4D97-AF65-F5344CB8AC3E}">
-        <p14:creationId xmlns:p14="http://schemas.microsoft.com/office/powerpoint/2010/main" val="1563382528"/>
+        <p14:creationId xmlns:p14="http://schemas.microsoft.com/office/powerpoint/2010/main" val="2657233055"/>
       </p:ext>
     </p:extLst>
   </p:cSld>
@@ -748,7 +813,7 @@
               <a:rPr lang="en-US" smtClean="0"/>
               <a:t>Click to edit Master title style</a:t>
             </a:r>
-            <a:endParaRPr lang="en-US"/>
+            <a:endParaRPr lang="en-US" dirty="0"/>
           </a:p>
         </p:txBody>
       </p:sp>
@@ -800,7 +865,7 @@
               <a:rPr lang="en-US" smtClean="0"/>
               <a:t>Fifth level</a:t>
             </a:r>
-            <a:endParaRPr lang="en-US"/>
+            <a:endParaRPr lang="en-US" dirty="0"/>
           </a:p>
         </p:txBody>
       </p:sp>
@@ -821,7 +886,7 @@
           <a:p>
             <a:fld id="{EF687610-B264-4EE2-9162-558FC9B97517}" type="datetimeFigureOut">
               <a:rPr lang="en-US" smtClean="0"/>
-              <a:t>5/5/2014</a:t>
+              <a:t>2014-05-05</a:t>
             </a:fld>
             <a:endParaRPr lang="en-US"/>
           </a:p>
@@ -872,7 +937,7 @@
     </p:spTree>
     <p:extLst>
       <p:ext uri="{BB962C8B-B14F-4D97-AF65-F5344CB8AC3E}">
-        <p14:creationId xmlns:p14="http://schemas.microsoft.com/office/powerpoint/2010/main" val="4227420904"/>
+        <p14:creationId xmlns:p14="http://schemas.microsoft.com/office/powerpoint/2010/main" val="1586306765"/>
       </p:ext>
     </p:extLst>
   </p:cSld>
@@ -911,15 +976,20 @@
         </p:nvSpPr>
         <p:spPr>
           <a:xfrm>
-            <a:off x="722313" y="4406900"/>
-            <a:ext cx="7772400" cy="1362075"/>
+            <a:off x="946404" y="758952"/>
+            <a:ext cx="7063740" cy="4041648"/>
           </a:xfrm>
         </p:spPr>
         <p:txBody>
-          <a:bodyPr anchor="t"/>
+          <a:bodyPr anchor="b">
+            <a:normAutofit/>
+          </a:bodyPr>
           <a:lstStyle>
-            <a:lvl1pPr algn="l">
-              <a:defRPr sz="4000" b="1" cap="all"/>
+            <a:lvl1pPr>
+              <a:lnSpc>
+                <a:spcPct val="85000"/>
+              </a:lnSpc>
+              <a:defRPr sz="6600" b="0"/>
             </a:lvl1pPr>
           </a:lstStyle>
           <a:p>
@@ -927,7 +997,7 @@
               <a:rPr lang="en-US" smtClean="0"/>
               <a:t>Click to edit Master title style</a:t>
             </a:r>
-            <a:endParaRPr lang="en-US"/>
+            <a:endParaRPr lang="en-US" dirty="0"/>
           </a:p>
         </p:txBody>
       </p:sp>
@@ -943,19 +1013,22 @@
         </p:nvSpPr>
         <p:spPr>
           <a:xfrm>
-            <a:off x="722313" y="2906713"/>
-            <a:ext cx="7772400" cy="1500187"/>
+            <a:off x="946404" y="4800600"/>
+            <a:ext cx="7063740" cy="1691640"/>
           </a:xfrm>
         </p:spPr>
         <p:txBody>
-          <a:bodyPr anchor="b"/>
+          <a:bodyPr anchor="t">
+            <a:normAutofit/>
+          </a:bodyPr>
           <a:lstStyle>
             <a:lvl1pPr marL="0" indent="0">
               <a:buNone/>
               <a:defRPr sz="2000">
                 <a:solidFill>
                   <a:schemeClr val="tx1">
-                    <a:tint val="75000"/>
+                    <a:lumMod val="75000"/>
+                    <a:lumOff val="25000"/>
                   </a:schemeClr>
                 </a:solidFill>
               </a:defRPr>
@@ -1067,7 +1140,7 @@
           <a:p>
             <a:fld id="{EF687610-B264-4EE2-9162-558FC9B97517}" type="datetimeFigureOut">
               <a:rPr lang="en-US" smtClean="0"/>
-              <a:t>5/5/2014</a:t>
+              <a:t>2014-05-05</a:t>
             </a:fld>
             <a:endParaRPr lang="en-US"/>
           </a:p>
@@ -1115,10 +1188,48 @@
           </a:p>
         </p:txBody>
       </p:sp>
+      <p:sp>
+        <p:nvSpPr>
+          <p:cNvPr id="7" name="Rectangle 6"/>
+          <p:cNvSpPr/>
+          <p:nvPr/>
+        </p:nvSpPr>
+        <p:spPr>
+          <a:xfrm>
+            <a:off x="0" y="0"/>
+            <a:ext cx="342900" cy="6858000"/>
+          </a:xfrm>
+          <a:prstGeom prst="rect">
+            <a:avLst/>
+          </a:prstGeom>
+          <a:solidFill>
+            <a:schemeClr val="accent1"/>
+          </a:solidFill>
+          <a:ln>
+            <a:noFill/>
+          </a:ln>
+        </p:spPr>
+        <p:style>
+          <a:lnRef idx="2">
+            <a:schemeClr val="accent1">
+              <a:shade val="50000"/>
+            </a:schemeClr>
+          </a:lnRef>
+          <a:fillRef idx="1">
+            <a:schemeClr val="accent1"/>
+          </a:fillRef>
+          <a:effectRef idx="0">
+            <a:schemeClr val="accent1"/>
+          </a:effectRef>
+          <a:fontRef idx="minor">
+            <a:schemeClr val="lt1"/>
+          </a:fontRef>
+        </p:style>
+      </p:sp>
     </p:spTree>
     <p:extLst>
       <p:ext uri="{BB962C8B-B14F-4D97-AF65-F5344CB8AC3E}">
-        <p14:creationId xmlns:p14="http://schemas.microsoft.com/office/powerpoint/2010/main" val="415827386"/>
+        <p14:creationId xmlns:p14="http://schemas.microsoft.com/office/powerpoint/2010/main" val="1266065820"/>
       </p:ext>
     </p:extLst>
   </p:cSld>
@@ -1164,7 +1275,7 @@
               <a:rPr lang="en-US" smtClean="0"/>
               <a:t>Click to edit Master title style</a:t>
             </a:r>
-            <a:endParaRPr lang="en-US"/>
+            <a:endParaRPr lang="en-US" dirty="0"/>
           </a:p>
         </p:txBody>
       </p:sp>
@@ -1180,39 +1291,39 @@
         </p:nvSpPr>
         <p:spPr>
           <a:xfrm>
-            <a:off x="457200" y="1600200"/>
-            <a:ext cx="4038600" cy="4525963"/>
+            <a:off x="946404" y="1828801"/>
+            <a:ext cx="3360420" cy="4351337"/>
           </a:xfrm>
         </p:spPr>
         <p:txBody>
           <a:bodyPr/>
           <a:lstStyle>
             <a:lvl1pPr>
-              <a:defRPr sz="2800"/>
+              <a:defRPr sz="1800"/>
             </a:lvl1pPr>
             <a:lvl2pPr>
-              <a:defRPr sz="2400"/>
+              <a:defRPr sz="1600"/>
             </a:lvl2pPr>
             <a:lvl3pPr>
-              <a:defRPr sz="2000"/>
+              <a:defRPr sz="1400"/>
             </a:lvl3pPr>
             <a:lvl4pPr>
-              <a:defRPr sz="1800"/>
+              <a:defRPr sz="1400"/>
             </a:lvl4pPr>
             <a:lvl5pPr>
-              <a:defRPr sz="1800"/>
+              <a:defRPr sz="1400"/>
             </a:lvl5pPr>
             <a:lvl6pPr>
-              <a:defRPr sz="1800"/>
+              <a:defRPr sz="1400"/>
             </a:lvl6pPr>
             <a:lvl7pPr>
-              <a:defRPr sz="1800"/>
+              <a:defRPr sz="1400"/>
             </a:lvl7pPr>
             <a:lvl8pPr>
-              <a:defRPr sz="1800"/>
+              <a:defRPr sz="1400"/>
             </a:lvl8pPr>
             <a:lvl9pPr>
-              <a:defRPr sz="1800"/>
+              <a:defRPr sz="1400"/>
             </a:lvl9pPr>
           </a:lstStyle>
           <a:p>
@@ -1249,7 +1360,7 @@
               <a:rPr lang="en-US" smtClean="0"/>
               <a:t>Fifth level</a:t>
             </a:r>
-            <a:endParaRPr lang="en-US"/>
+            <a:endParaRPr lang="en-US" dirty="0"/>
           </a:p>
         </p:txBody>
       </p:sp>
@@ -1265,39 +1376,39 @@
         </p:nvSpPr>
         <p:spPr>
           <a:xfrm>
-            <a:off x="4648200" y="1600200"/>
-            <a:ext cx="4038600" cy="4525963"/>
+            <a:off x="4594860" y="1828801"/>
+            <a:ext cx="3360420" cy="4351337"/>
           </a:xfrm>
         </p:spPr>
         <p:txBody>
           <a:bodyPr/>
           <a:lstStyle>
             <a:lvl1pPr>
-              <a:defRPr sz="2800"/>
+              <a:defRPr sz="1800"/>
             </a:lvl1pPr>
             <a:lvl2pPr>
-              <a:defRPr sz="2400"/>
+              <a:defRPr sz="1600"/>
             </a:lvl2pPr>
             <a:lvl3pPr>
-              <a:defRPr sz="2000"/>
+              <a:defRPr sz="1400"/>
             </a:lvl3pPr>
             <a:lvl4pPr>
-              <a:defRPr sz="1800"/>
+              <a:defRPr sz="1400"/>
             </a:lvl4pPr>
             <a:lvl5pPr>
-              <a:defRPr sz="1800"/>
+              <a:defRPr sz="1400"/>
             </a:lvl5pPr>
             <a:lvl6pPr>
-              <a:defRPr sz="1800"/>
+              <a:defRPr sz="1400"/>
             </a:lvl6pPr>
             <a:lvl7pPr>
-              <a:defRPr sz="1800"/>
+              <a:defRPr sz="1400"/>
             </a:lvl7pPr>
             <a:lvl8pPr>
-              <a:defRPr sz="1800"/>
+              <a:defRPr sz="1400"/>
             </a:lvl8pPr>
             <a:lvl9pPr>
-              <a:defRPr sz="1800"/>
+              <a:defRPr sz="1400"/>
             </a:lvl9pPr>
           </a:lstStyle>
           <a:p>
@@ -1334,7 +1445,7 @@
               <a:rPr lang="en-US" smtClean="0"/>
               <a:t>Fifth level</a:t>
             </a:r>
-            <a:endParaRPr lang="en-US"/>
+            <a:endParaRPr lang="en-US" dirty="0"/>
           </a:p>
         </p:txBody>
       </p:sp>
@@ -1355,7 +1466,7 @@
           <a:p>
             <a:fld id="{EF687610-B264-4EE2-9162-558FC9B97517}" type="datetimeFigureOut">
               <a:rPr lang="en-US" smtClean="0"/>
-              <a:t>5/5/2014</a:t>
+              <a:t>2014-05-05</a:t>
             </a:fld>
             <a:endParaRPr lang="en-US"/>
           </a:p>
@@ -1406,7 +1517,7 @@
     </p:spTree>
     <p:extLst>
       <p:ext uri="{BB962C8B-B14F-4D97-AF65-F5344CB8AC3E}">
-        <p14:creationId xmlns:p14="http://schemas.microsoft.com/office/powerpoint/2010/main" val="732068850"/>
+        <p14:creationId xmlns:p14="http://schemas.microsoft.com/office/powerpoint/2010/main" val="238869777"/>
       </p:ext>
     </p:extLst>
   </p:cSld>
@@ -1435,7 +1546,7 @@
       </p:grpSpPr>
       <p:sp>
         <p:nvSpPr>
-          <p:cNvPr id="2" name="Title 1"/>
+          <p:cNvPr id="10" name="Title 9"/>
           <p:cNvSpPr>
             <a:spLocks noGrp="1"/>
           </p:cNvSpPr>
@@ -1446,17 +1557,13 @@
         <p:spPr/>
         <p:txBody>
           <a:bodyPr/>
-          <a:lstStyle>
-            <a:lvl1pPr>
-              <a:defRPr/>
-            </a:lvl1pPr>
-          </a:lstStyle>
+          <a:lstStyle/>
           <a:p>
             <a:r>
               <a:rPr lang="en-US" smtClean="0"/>
               <a:t>Click to edit Master title style</a:t>
             </a:r>
-            <a:endParaRPr lang="en-US"/>
+            <a:endParaRPr lang="en-US" dirty="0"/>
           </a:p>
         </p:txBody>
       </p:sp>
@@ -1472,20 +1579,29 @@
         </p:nvSpPr>
         <p:spPr>
           <a:xfrm>
-            <a:off x="457200" y="1535113"/>
-            <a:ext cx="4040188" cy="639762"/>
+            <a:off x="946404" y="1717185"/>
+            <a:ext cx="3360420" cy="731520"/>
           </a:xfrm>
         </p:spPr>
         <p:txBody>
-          <a:bodyPr anchor="b"/>
+          <a:bodyPr anchor="b">
+            <a:normAutofit/>
+          </a:bodyPr>
           <a:lstStyle>
             <a:lvl1pPr marL="0" indent="0">
-              <a:buNone/>
-              <a:defRPr sz="2400" b="1"/>
+              <a:spcBef>
+                <a:spcPts val="0"/>
+              </a:spcBef>
+              <a:buNone/>
+              <a:defRPr sz="1800" b="0">
+                <a:solidFill>
+                  <a:schemeClr val="tx2"/>
+                </a:solidFill>
+              </a:defRPr>
             </a:lvl1pPr>
             <a:lvl2pPr marL="457200" indent="0">
               <a:buNone/>
-              <a:defRPr sz="2000" b="1"/>
+              <a:defRPr sz="1800" b="1"/>
             </a:lvl2pPr>
             <a:lvl3pPr marL="914400" indent="0">
               <a:buNone/>
@@ -1537,39 +1653,39 @@
         </p:nvSpPr>
         <p:spPr>
           <a:xfrm>
-            <a:off x="457200" y="2174875"/>
-            <a:ext cx="4040188" cy="3951288"/>
+            <a:off x="946404" y="2507550"/>
+            <a:ext cx="3360420" cy="3664650"/>
           </a:xfrm>
         </p:spPr>
         <p:txBody>
           <a:bodyPr/>
           <a:lstStyle>
             <a:lvl1pPr>
-              <a:defRPr sz="2400"/>
+              <a:defRPr sz="1800"/>
             </a:lvl1pPr>
             <a:lvl2pPr>
-              <a:defRPr sz="2000"/>
+              <a:defRPr sz="1600"/>
             </a:lvl2pPr>
             <a:lvl3pPr>
-              <a:defRPr sz="1800"/>
+              <a:defRPr sz="1400"/>
             </a:lvl3pPr>
             <a:lvl4pPr>
-              <a:defRPr sz="1600"/>
+              <a:defRPr sz="1400"/>
             </a:lvl4pPr>
             <a:lvl5pPr>
-              <a:defRPr sz="1600"/>
+              <a:defRPr sz="1400"/>
             </a:lvl5pPr>
             <a:lvl6pPr>
-              <a:defRPr sz="1600"/>
+              <a:defRPr sz="1400"/>
             </a:lvl6pPr>
             <a:lvl7pPr>
-              <a:defRPr sz="1600"/>
+              <a:defRPr sz="1400"/>
             </a:lvl7pPr>
             <a:lvl8pPr>
-              <a:defRPr sz="1600"/>
+              <a:defRPr sz="1400"/>
             </a:lvl8pPr>
             <a:lvl9pPr>
-              <a:defRPr sz="1600"/>
+              <a:defRPr sz="1400"/>
             </a:lvl9pPr>
           </a:lstStyle>
           <a:p>
@@ -1606,64 +1722,113 @@
               <a:rPr lang="en-US" smtClean="0"/>
               <a:t>Fifth level</a:t>
             </a:r>
-            <a:endParaRPr lang="en-US"/>
-          </a:p>
-        </p:txBody>
-      </p:sp>
-      <p:sp>
-        <p:nvSpPr>
-          <p:cNvPr id="5" name="Text Placeholder 4"/>
-          <p:cNvSpPr>
-            <a:spLocks noGrp="1"/>
-          </p:cNvSpPr>
-          <p:nvPr>
-            <p:ph type="body" sz="quarter" idx="3"/>
+            <a:endParaRPr lang="en-US" dirty="0"/>
+          </a:p>
+        </p:txBody>
+      </p:sp>
+      <p:sp>
+        <p:nvSpPr>
+          <p:cNvPr id="11" name="Text Placeholder 10"/>
+          <p:cNvSpPr>
+            <a:spLocks noGrp="1"/>
+          </p:cNvSpPr>
+          <p:nvPr>
+            <p:ph type="body" sz="quarter" idx="13"/>
           </p:nvPr>
         </p:nvSpPr>
         <p:spPr>
           <a:xfrm>
-            <a:off x="4645025" y="1535113"/>
-            <a:ext cx="4041775" cy="639762"/>
+            <a:off x="4599432" y="1717185"/>
+            <a:ext cx="3364992" cy="731520"/>
           </a:xfrm>
         </p:spPr>
         <p:txBody>
-          <a:bodyPr anchor="b"/>
+          <a:bodyPr anchor="b">
+            <a:normAutofit/>
+          </a:bodyPr>
           <a:lstStyle>
             <a:lvl1pPr marL="0" indent="0">
-              <a:buNone/>
-              <a:defRPr sz="2400" b="1"/>
+              <a:buFontTx/>
+              <a:buNone/>
+              <a:defRPr lang="en-US" sz="1800" b="0" kern="1200" spc="10" baseline="0" dirty="0">
+                <a:solidFill>
+                  <a:schemeClr val="tx2"/>
+                </a:solidFill>
+                <a:latin typeface="+mn-lt"/>
+                <a:ea typeface="+mn-ea"/>
+                <a:cs typeface="+mn-cs"/>
+              </a:defRPr>
             </a:lvl1pPr>
-            <a:lvl2pPr marL="457200" indent="0">
-              <a:buNone/>
-              <a:defRPr sz="2000" b="1"/>
+          </a:lstStyle>
+          <a:p>
+            <a:pPr marL="0" lvl="0" indent="0" algn="l" defTabSz="914400" rtl="0" eaLnBrk="1" latinLnBrk="0" hangingPunct="1">
+              <a:lnSpc>
+                <a:spcPct val="95000"/>
+              </a:lnSpc>
+              <a:spcBef>
+                <a:spcPts val="0"/>
+              </a:spcBef>
+              <a:spcAft>
+                <a:spcPts val="200"/>
+              </a:spcAft>
+              <a:buClr>
+                <a:schemeClr val="accent1"/>
+              </a:buClr>
+              <a:buSzPct val="80000"/>
+              <a:buNone/>
+            </a:pPr>
+            <a:r>
+              <a:rPr lang="en-US" smtClean="0"/>
+              <a:t>Click to edit Master text styles</a:t>
+            </a:r>
+          </a:p>
+        </p:txBody>
+      </p:sp>
+      <p:sp>
+        <p:nvSpPr>
+          <p:cNvPr id="6" name="Content Placeholder 5"/>
+          <p:cNvSpPr>
+            <a:spLocks noGrp="1"/>
+          </p:cNvSpPr>
+          <p:nvPr>
+            <p:ph sz="quarter" idx="4"/>
+          </p:nvPr>
+        </p:nvSpPr>
+        <p:spPr>
+          <a:xfrm>
+            <a:off x="4594860" y="2507550"/>
+            <a:ext cx="3360420" cy="3664650"/>
+          </a:xfrm>
+        </p:spPr>
+        <p:txBody>
+          <a:bodyPr/>
+          <a:lstStyle>
+            <a:lvl1pPr>
+              <a:defRPr sz="1800"/>
+            </a:lvl1pPr>
+            <a:lvl2pPr>
+              <a:defRPr sz="1600"/>
             </a:lvl2pPr>
-            <a:lvl3pPr marL="914400" indent="0">
-              <a:buNone/>
-              <a:defRPr sz="1800" b="1"/>
+            <a:lvl3pPr>
+              <a:defRPr sz="1400"/>
             </a:lvl3pPr>
-            <a:lvl4pPr marL="1371600" indent="0">
-              <a:buNone/>
-              <a:defRPr sz="1600" b="1"/>
+            <a:lvl4pPr>
+              <a:defRPr sz="1400"/>
             </a:lvl4pPr>
-            <a:lvl5pPr marL="1828800" indent="0">
-              <a:buNone/>
-              <a:defRPr sz="1600" b="1"/>
+            <a:lvl5pPr>
+              <a:defRPr sz="1400"/>
             </a:lvl5pPr>
-            <a:lvl6pPr marL="2286000" indent="0">
-              <a:buNone/>
-              <a:defRPr sz="1600" b="1"/>
+            <a:lvl6pPr>
+              <a:defRPr sz="1400"/>
             </a:lvl6pPr>
-            <a:lvl7pPr marL="2743200" indent="0">
-              <a:buNone/>
-              <a:defRPr sz="1600" b="1"/>
+            <a:lvl7pPr>
+              <a:defRPr sz="1400"/>
             </a:lvl7pPr>
-            <a:lvl8pPr marL="3200400" indent="0">
-              <a:buNone/>
-              <a:defRPr sz="1600" b="1"/>
+            <a:lvl8pPr>
+              <a:defRPr sz="1400"/>
             </a:lvl8pPr>
-            <a:lvl9pPr marL="3657600" indent="0">
-              <a:buNone/>
-              <a:defRPr sz="1600" b="1"/>
+            <a:lvl9pPr>
+              <a:defRPr sz="1400"/>
             </a:lvl9pPr>
           </a:lstStyle>
           <a:p>
@@ -1673,62 +1838,6 @@
               <a:t>Click to edit Master text styles</a:t>
             </a:r>
           </a:p>
-        </p:txBody>
-      </p:sp>
-      <p:sp>
-        <p:nvSpPr>
-          <p:cNvPr id="6" name="Content Placeholder 5"/>
-          <p:cNvSpPr>
-            <a:spLocks noGrp="1"/>
-          </p:cNvSpPr>
-          <p:nvPr>
-            <p:ph sz="quarter" idx="4"/>
-          </p:nvPr>
-        </p:nvSpPr>
-        <p:spPr>
-          <a:xfrm>
-            <a:off x="4645025" y="2174875"/>
-            <a:ext cx="4041775" cy="3951288"/>
-          </a:xfrm>
-        </p:spPr>
-        <p:txBody>
-          <a:bodyPr/>
-          <a:lstStyle>
-            <a:lvl1pPr>
-              <a:defRPr sz="2400"/>
-            </a:lvl1pPr>
-            <a:lvl2pPr>
-              <a:defRPr sz="2000"/>
-            </a:lvl2pPr>
-            <a:lvl3pPr>
-              <a:defRPr sz="1800"/>
-            </a:lvl3pPr>
-            <a:lvl4pPr>
-              <a:defRPr sz="1600"/>
-            </a:lvl4pPr>
-            <a:lvl5pPr>
-              <a:defRPr sz="1600"/>
-            </a:lvl5pPr>
-            <a:lvl6pPr>
-              <a:defRPr sz="1600"/>
-            </a:lvl6pPr>
-            <a:lvl7pPr>
-              <a:defRPr sz="1600"/>
-            </a:lvl7pPr>
-            <a:lvl8pPr>
-              <a:defRPr sz="1600"/>
-            </a:lvl8pPr>
-            <a:lvl9pPr>
-              <a:defRPr sz="1600"/>
-            </a:lvl9pPr>
-          </a:lstStyle>
-          <a:p>
-            <a:pPr lvl="0"/>
-            <a:r>
-              <a:rPr lang="en-US" smtClean="0"/>
-              <a:t>Click to edit Master text styles</a:t>
-            </a:r>
-          </a:p>
           <a:p>
             <a:pPr lvl="1"/>
             <a:r>
@@ -1756,7 +1865,7 @@
               <a:rPr lang="en-US" smtClean="0"/>
               <a:t>Fifth level</a:t>
             </a:r>
-            <a:endParaRPr lang="en-US"/>
+            <a:endParaRPr lang="en-US" dirty="0"/>
           </a:p>
         </p:txBody>
       </p:sp>
@@ -1777,7 +1886,7 @@
           <a:p>
             <a:fld id="{EF687610-B264-4EE2-9162-558FC9B97517}" type="datetimeFigureOut">
               <a:rPr lang="en-US" smtClean="0"/>
-              <a:t>5/5/2014</a:t>
+              <a:t>2014-05-05</a:t>
             </a:fld>
             <a:endParaRPr lang="en-US"/>
           </a:p>
@@ -1828,7 +1937,7 @@
     </p:spTree>
     <p:extLst>
       <p:ext uri="{BB962C8B-B14F-4D97-AF65-F5344CB8AC3E}">
-        <p14:creationId xmlns:p14="http://schemas.microsoft.com/office/powerpoint/2010/main" val="413160778"/>
+        <p14:creationId xmlns:p14="http://schemas.microsoft.com/office/powerpoint/2010/main" val="3661877642"/>
       </p:ext>
     </p:extLst>
   </p:cSld>
@@ -1857,7 +1966,7 @@
       </p:grpSpPr>
       <p:sp>
         <p:nvSpPr>
-          <p:cNvPr id="2" name="Title 1"/>
+          <p:cNvPr id="6" name="Title 5"/>
           <p:cNvSpPr>
             <a:spLocks noGrp="1"/>
           </p:cNvSpPr>
@@ -1874,7 +1983,7 @@
               <a:rPr lang="en-US" smtClean="0"/>
               <a:t>Click to edit Master title style</a:t>
             </a:r>
-            <a:endParaRPr lang="en-US"/>
+            <a:endParaRPr lang="en-US" dirty="0"/>
           </a:p>
         </p:txBody>
       </p:sp>
@@ -1895,7 +2004,7 @@
           <a:p>
             <a:fld id="{EF687610-B264-4EE2-9162-558FC9B97517}" type="datetimeFigureOut">
               <a:rPr lang="en-US" smtClean="0"/>
-              <a:t>5/5/2014</a:t>
+              <a:t>2014-05-05</a:t>
             </a:fld>
             <a:endParaRPr lang="en-US"/>
           </a:p>
@@ -1946,7 +2055,7 @@
     </p:spTree>
     <p:extLst>
       <p:ext uri="{BB962C8B-B14F-4D97-AF65-F5344CB8AC3E}">
-        <p14:creationId xmlns:p14="http://schemas.microsoft.com/office/powerpoint/2010/main" val="1858926410"/>
+        <p14:creationId xmlns:p14="http://schemas.microsoft.com/office/powerpoint/2010/main" val="501818175"/>
       </p:ext>
     </p:extLst>
   </p:cSld>
@@ -1990,7 +2099,7 @@
           <a:p>
             <a:fld id="{EF687610-B264-4EE2-9162-558FC9B97517}" type="datetimeFigureOut">
               <a:rPr lang="en-US" smtClean="0"/>
-              <a:t>5/5/2014</a:t>
+              <a:t>2014-05-05</a:t>
             </a:fld>
             <a:endParaRPr lang="en-US"/>
           </a:p>
@@ -2041,7 +2150,7 @@
     </p:spTree>
     <p:extLst>
       <p:ext uri="{BB962C8B-B14F-4D97-AF65-F5344CB8AC3E}">
-        <p14:creationId xmlns:p14="http://schemas.microsoft.com/office/powerpoint/2010/main" val="4119436766"/>
+        <p14:creationId xmlns:p14="http://schemas.microsoft.com/office/powerpoint/2010/main" val="2939293053"/>
       </p:ext>
     </p:extLst>
   </p:cSld>
@@ -2080,15 +2189,17 @@
         </p:nvSpPr>
         <p:spPr>
           <a:xfrm>
-            <a:off x="457200" y="273050"/>
-            <a:ext cx="3008313" cy="1162050"/>
+            <a:off x="630936" y="457201"/>
+            <a:ext cx="2400300" cy="1600197"/>
           </a:xfrm>
         </p:spPr>
         <p:txBody>
-          <a:bodyPr anchor="b"/>
+          <a:bodyPr anchor="b">
+            <a:normAutofit/>
+          </a:bodyPr>
           <a:lstStyle>
-            <a:lvl1pPr algn="l">
-              <a:defRPr sz="2000" b="1"/>
+            <a:lvl1pPr>
+              <a:defRPr sz="2800" b="0" baseline="0"/>
             </a:lvl1pPr>
           </a:lstStyle>
           <a:p>
@@ -2096,7 +2207,7 @@
               <a:rPr lang="en-US" smtClean="0"/>
               <a:t>Click to edit Master title style</a:t>
             </a:r>
-            <a:endParaRPr lang="en-US"/>
+            <a:endParaRPr lang="en-US" dirty="0"/>
           </a:p>
         </p:txBody>
       </p:sp>
@@ -2112,39 +2223,39 @@
         </p:nvSpPr>
         <p:spPr>
           <a:xfrm>
-            <a:off x="3575050" y="273050"/>
-            <a:ext cx="5111750" cy="5853113"/>
+            <a:off x="3378200" y="685800"/>
+            <a:ext cx="4559300" cy="5486400"/>
           </a:xfrm>
         </p:spPr>
         <p:txBody>
           <a:bodyPr/>
           <a:lstStyle>
             <a:lvl1pPr>
-              <a:defRPr sz="3200"/>
+              <a:defRPr sz="1800"/>
             </a:lvl1pPr>
             <a:lvl2pPr>
-              <a:defRPr sz="2800"/>
+              <a:defRPr sz="1600"/>
             </a:lvl2pPr>
             <a:lvl3pPr>
-              <a:defRPr sz="2400"/>
+              <a:defRPr sz="1400"/>
             </a:lvl3pPr>
             <a:lvl4pPr>
-              <a:defRPr sz="2000"/>
+              <a:defRPr sz="1400"/>
             </a:lvl4pPr>
             <a:lvl5pPr>
-              <a:defRPr sz="2000"/>
+              <a:defRPr sz="1400"/>
             </a:lvl5pPr>
             <a:lvl6pPr>
-              <a:defRPr sz="2000"/>
+              <a:defRPr sz="1400"/>
             </a:lvl6pPr>
             <a:lvl7pPr>
-              <a:defRPr sz="2000"/>
+              <a:defRPr sz="1400"/>
             </a:lvl7pPr>
             <a:lvl8pPr>
-              <a:defRPr sz="2000"/>
+              <a:defRPr sz="1400"/>
             </a:lvl8pPr>
             <a:lvl9pPr>
-              <a:defRPr sz="2000"/>
+              <a:defRPr sz="1400"/>
             </a:lvl9pPr>
           </a:lstStyle>
           <a:p>
@@ -2181,7 +2292,7 @@
               <a:rPr lang="en-US" smtClean="0"/>
               <a:t>Fifth level</a:t>
             </a:r>
-            <a:endParaRPr lang="en-US"/>
+            <a:endParaRPr lang="en-US" dirty="0"/>
           </a:p>
         </p:txBody>
       </p:sp>
@@ -2197,16 +2308,24 @@
         </p:nvSpPr>
         <p:spPr>
           <a:xfrm>
-            <a:off x="457200" y="1435100"/>
-            <a:ext cx="3008313" cy="4691063"/>
+            <a:off x="630936" y="2099735"/>
+            <a:ext cx="2400300" cy="3810001"/>
           </a:xfrm>
         </p:spPr>
         <p:txBody>
-          <a:bodyPr/>
+          <a:bodyPr>
+            <a:normAutofit/>
+          </a:bodyPr>
           <a:lstStyle>
             <a:lvl1pPr marL="0" indent="0">
-              <a:buNone/>
-              <a:defRPr sz="1400"/>
+              <a:lnSpc>
+                <a:spcPct val="114000"/>
+              </a:lnSpc>
+              <a:spcBef>
+                <a:spcPts val="800"/>
+              </a:spcBef>
+              <a:buNone/>
+              <a:defRPr sz="1300"/>
             </a:lvl1pPr>
             <a:lvl2pPr marL="457200" indent="0">
               <a:buNone/>
@@ -2267,7 +2386,7 @@
           <a:p>
             <a:fld id="{EF687610-B264-4EE2-9162-558FC9B97517}" type="datetimeFigureOut">
               <a:rPr lang="en-US" smtClean="0"/>
-              <a:t>5/5/2014</a:t>
+              <a:t>2014-05-05</a:t>
             </a:fld>
             <a:endParaRPr lang="en-US"/>
           </a:p>
@@ -2318,7 +2437,7 @@
     </p:spTree>
     <p:extLst>
       <p:ext uri="{BB962C8B-B14F-4D97-AF65-F5344CB8AC3E}">
-        <p14:creationId xmlns:p14="http://schemas.microsoft.com/office/powerpoint/2010/main" val="2809344012"/>
+        <p14:creationId xmlns:p14="http://schemas.microsoft.com/office/powerpoint/2010/main" val="3205017532"/>
       </p:ext>
     </p:extLst>
   </p:cSld>
@@ -2347,25 +2466,69 @@
       </p:grpSpPr>
       <p:sp>
         <p:nvSpPr>
-          <p:cNvPr id="2" name="Title 1"/>
-          <p:cNvSpPr>
-            <a:spLocks noGrp="1"/>
-          </p:cNvSpPr>
-          <p:nvPr>
-            <p:ph type="title"/>
-          </p:nvPr>
+          <p:cNvPr id="8" name="Rectangle 7"/>
+          <p:cNvSpPr/>
+          <p:nvPr/>
         </p:nvSpPr>
         <p:spPr>
           <a:xfrm>
-            <a:off x="1792288" y="4800600"/>
-            <a:ext cx="5486400" cy="566738"/>
+            <a:off x="0" y="5105400"/>
+            <a:ext cx="8469630" cy="1752600"/>
+          </a:xfrm>
+          <a:prstGeom prst="rect">
+            <a:avLst/>
+          </a:prstGeom>
+          <a:solidFill>
+            <a:srgbClr val="000000"/>
+          </a:solidFill>
+          <a:ln>
+            <a:noFill/>
+          </a:ln>
+        </p:spPr>
+        <p:style>
+          <a:lnRef idx="2">
+            <a:schemeClr val="accent1">
+              <a:shade val="50000"/>
+            </a:schemeClr>
+          </a:lnRef>
+          <a:fillRef idx="1">
+            <a:schemeClr val="accent1"/>
+          </a:fillRef>
+          <a:effectRef idx="0">
+            <a:schemeClr val="accent1"/>
+          </a:effectRef>
+          <a:fontRef idx="minor">
+            <a:schemeClr val="lt1"/>
+          </a:fontRef>
+        </p:style>
+      </p:sp>
+      <p:sp>
+        <p:nvSpPr>
+          <p:cNvPr id="2" name="Title 1"/>
+          <p:cNvSpPr>
+            <a:spLocks noGrp="1"/>
+          </p:cNvSpPr>
+          <p:nvPr>
+            <p:ph type="title"/>
+          </p:nvPr>
+        </p:nvSpPr>
+        <p:spPr>
+          <a:xfrm>
+            <a:off x="685800" y="5257800"/>
+            <a:ext cx="7486650" cy="914400"/>
           </a:xfrm>
         </p:spPr>
         <p:txBody>
-          <a:bodyPr anchor="b"/>
+          <a:bodyPr anchor="b">
+            <a:normAutofit/>
+          </a:bodyPr>
           <a:lstStyle>
-            <a:lvl1pPr algn="l">
-              <a:defRPr sz="2000" b="1"/>
+            <a:lvl1pPr>
+              <a:defRPr sz="2800" b="0">
+                <a:solidFill>
+                  <a:schemeClr val="bg1"/>
+                </a:solidFill>
+              </a:defRPr>
             </a:lvl1pPr>
           </a:lstStyle>
           <a:p>
@@ -2373,7 +2536,7 @@
               <a:rPr lang="en-US" smtClean="0"/>
               <a:t>Click to edit Master title style</a:t>
             </a:r>
-            <a:endParaRPr lang="en-US"/>
+            <a:endParaRPr lang="en-US" dirty="0"/>
           </a:p>
         </p:txBody>
       </p:sp>
@@ -2381,7 +2544,7 @@
         <p:nvSpPr>
           <p:cNvPr id="3" name="Picture Placeholder 2"/>
           <p:cNvSpPr>
-            <a:spLocks noGrp="1"/>
+            <a:spLocks noGrp="1" noChangeAspect="1"/>
           </p:cNvSpPr>
           <p:nvPr>
             <p:ph type="pic" idx="1"/>
@@ -2389,16 +2552,23 @@
         </p:nvSpPr>
         <p:spPr>
           <a:xfrm>
-            <a:off x="1792288" y="612775"/>
-            <a:ext cx="5486400" cy="4114800"/>
+            <a:off x="0" y="1"/>
+            <a:ext cx="8469630" cy="5128923"/>
           </a:xfrm>
+          <a:solidFill>
+            <a:schemeClr val="accent1"/>
+          </a:solidFill>
         </p:spPr>
         <p:txBody>
-          <a:bodyPr/>
+          <a:bodyPr anchor="t"/>
           <a:lstStyle>
             <a:lvl1pPr marL="0" indent="0">
               <a:buNone/>
-              <a:defRPr sz="3200"/>
+              <a:defRPr sz="3200">
+                <a:solidFill>
+                  <a:schemeClr val="bg1"/>
+                </a:solidFill>
+              </a:defRPr>
             </a:lvl1pPr>
             <a:lvl2pPr marL="457200" indent="0">
               <a:buNone/>
@@ -2434,7 +2604,11 @@
             </a:lvl9pPr>
           </a:lstStyle>
           <a:p>
-            <a:endParaRPr lang="en-US"/>
+            <a:r>
+              <a:rPr lang="en-US" smtClean="0"/>
+              <a:t>Click icon to add picture</a:t>
+            </a:r>
+            <a:endParaRPr lang="en-US" dirty="0"/>
           </a:p>
         </p:txBody>
       </p:sp>
@@ -2450,16 +2624,30 @@
         </p:nvSpPr>
         <p:spPr>
           <a:xfrm>
-            <a:off x="1792288" y="5367338"/>
-            <a:ext cx="5486400" cy="804862"/>
+            <a:off x="685800" y="6108590"/>
+            <a:ext cx="7486650" cy="597011"/>
           </a:xfrm>
         </p:spPr>
         <p:txBody>
-          <a:bodyPr/>
+          <a:bodyPr>
+            <a:normAutofit/>
+          </a:bodyPr>
           <a:lstStyle>
             <a:lvl1pPr marL="0" indent="0">
-              <a:buNone/>
-              <a:defRPr sz="1400"/>
+              <a:lnSpc>
+                <a:spcPct val="100000"/>
+              </a:lnSpc>
+              <a:spcBef>
+                <a:spcPts val="800"/>
+              </a:spcBef>
+              <a:buNone/>
+              <a:defRPr sz="1300">
+                <a:solidFill>
+                  <a:schemeClr val="bg1">
+                    <a:lumMod val="85000"/>
+                  </a:schemeClr>
+                </a:solidFill>
+              </a:defRPr>
             </a:lvl1pPr>
             <a:lvl2pPr marL="457200" indent="0">
               <a:buNone/>
@@ -2520,7 +2708,7 @@
           <a:p>
             <a:fld id="{EF687610-B264-4EE2-9162-558FC9B97517}" type="datetimeFigureOut">
               <a:rPr lang="en-US" smtClean="0"/>
-              <a:t>5/5/2014</a:t>
+              <a:t>2014-05-05</a:t>
             </a:fld>
             <a:endParaRPr lang="en-US"/>
           </a:p>
@@ -2571,7 +2759,7 @@
     </p:spTree>
     <p:extLst>
       <p:ext uri="{BB962C8B-B14F-4D97-AF65-F5344CB8AC3E}">
-        <p14:creationId xmlns:p14="http://schemas.microsoft.com/office/powerpoint/2010/main" val="3156280787"/>
+        <p14:creationId xmlns:p14="http://schemas.microsoft.com/office/powerpoint/2010/main" val="896594489"/>
       </p:ext>
     </p:extLst>
   </p:cSld>
@@ -2585,28 +2773,9 @@
 <p:sldMaster xmlns:a="http://schemas.openxmlformats.org/drawingml/2006/main" xmlns:r="http://schemas.openxmlformats.org/officeDocument/2006/relationships" xmlns:p="http://schemas.openxmlformats.org/presentationml/2006/main">
   <p:cSld>
     <p:bg>
-      <p:bgPr>
-        <a:gradFill flip="none" rotWithShape="1">
-          <a:gsLst>
-            <a:gs pos="0">
-              <a:schemeClr val="bg1">
-                <a:lumMod val="75000"/>
-              </a:schemeClr>
-            </a:gs>
-            <a:gs pos="14000">
-              <a:schemeClr val="bg1">
-                <a:lumMod val="85000"/>
-              </a:schemeClr>
-            </a:gs>
-            <a:gs pos="42000">
-              <a:schemeClr val="bg1"/>
-            </a:gs>
-          </a:gsLst>
-          <a:lin ang="18900000" scaled="1"/>
-          <a:tileRect/>
-        </a:gradFill>
-        <a:effectLst/>
-      </p:bgPr>
+      <p:bgRef idx="1001">
+        <a:schemeClr val="bg1"/>
+      </p:bgRef>
     </p:bg>
     <p:spTree>
       <p:nvGrpSpPr>
@@ -2624,25 +2793,65 @@
       </p:grpSpPr>
       <p:sp>
         <p:nvSpPr>
-          <p:cNvPr id="2" name="Title Placeholder 1"/>
-          <p:cNvSpPr>
-            <a:spLocks noGrp="1"/>
-          </p:cNvSpPr>
-          <p:nvPr>
-            <p:ph type="title"/>
-          </p:nvPr>
+          <p:cNvPr id="7" name="Rectangle 6"/>
+          <p:cNvSpPr/>
+          <p:nvPr/>
         </p:nvSpPr>
         <p:spPr>
           <a:xfrm>
-            <a:off x="457200" y="274638"/>
-            <a:ext cx="8229600" cy="1143000"/>
+            <a:off x="8418195" y="0"/>
+            <a:ext cx="731520" cy="6858000"/>
+          </a:xfrm>
+          <a:prstGeom prst="rect">
+            <a:avLst/>
+          </a:prstGeom>
+          <a:solidFill>
+            <a:schemeClr val="tx2">
+              <a:lumMod val="75000"/>
+            </a:schemeClr>
+          </a:solidFill>
+          <a:ln>
+            <a:noFill/>
+          </a:ln>
+        </p:spPr>
+        <p:style>
+          <a:lnRef idx="2">
+            <a:schemeClr val="accent1">
+              <a:shade val="50000"/>
+            </a:schemeClr>
+          </a:lnRef>
+          <a:fillRef idx="1">
+            <a:schemeClr val="accent1"/>
+          </a:fillRef>
+          <a:effectRef idx="0">
+            <a:schemeClr val="accent1"/>
+          </a:effectRef>
+          <a:fontRef idx="minor">
+            <a:schemeClr val="lt1"/>
+          </a:fontRef>
+        </p:style>
+      </p:sp>
+      <p:sp>
+        <p:nvSpPr>
+          <p:cNvPr id="2" name="Title Placeholder 1"/>
+          <p:cNvSpPr>
+            <a:spLocks noGrp="1"/>
+          </p:cNvSpPr>
+          <p:nvPr>
+            <p:ph type="title"/>
+          </p:nvPr>
+        </p:nvSpPr>
+        <p:spPr>
+          <a:xfrm>
+            <a:off x="946404" y="365760"/>
+            <a:ext cx="7269480" cy="1325562"/>
           </a:xfrm>
           <a:prstGeom prst="rect">
             <a:avLst/>
           </a:prstGeom>
         </p:spPr>
         <p:txBody>
-          <a:bodyPr vert="horz" lIns="91440" tIns="45720" rIns="91440" bIns="45720" rtlCol="0" anchor="ctr">
+          <a:bodyPr vert="horz" lIns="91440" tIns="45720" rIns="91440" bIns="45720" rtlCol="0" anchor="b">
             <a:normAutofit/>
           </a:bodyPr>
           <a:lstStyle/>
@@ -2651,7 +2860,7 @@
               <a:rPr lang="en-US" smtClean="0"/>
               <a:t>Click to edit Master title style</a:t>
             </a:r>
-            <a:endParaRPr lang="en-US"/>
+            <a:endParaRPr lang="en-US" dirty="0"/>
           </a:p>
         </p:txBody>
       </p:sp>
@@ -2667,8 +2876,8 @@
         </p:nvSpPr>
         <p:spPr>
           <a:xfrm>
-            <a:off x="457200" y="1600200"/>
-            <a:ext cx="8229600" cy="4525963"/>
+            <a:off x="946404" y="1828801"/>
+            <a:ext cx="6446520" cy="4351337"/>
           </a:xfrm>
           <a:prstGeom prst="rect">
             <a:avLst/>
@@ -2713,7 +2922,7 @@
               <a:rPr lang="en-US" smtClean="0"/>
               <a:t>Fifth level</a:t>
             </a:r>
-            <a:endParaRPr lang="en-US"/>
+            <a:endParaRPr lang="en-US" dirty="0"/>
           </a:p>
         </p:txBody>
       </p:sp>
@@ -2728,9 +2937,9 @@
           </p:nvPr>
         </p:nvSpPr>
         <p:spPr>
-          <a:xfrm>
-            <a:off x="457200" y="6356350"/>
-            <a:ext cx="2133600" cy="365125"/>
+          <a:xfrm rot="16200000">
+            <a:off x="7831456" y="1044178"/>
+            <a:ext cx="1904999" cy="273844"/>
           </a:xfrm>
           <a:prstGeom prst="rect">
             <a:avLst/>
@@ -2739,11 +2948,12 @@
         <p:txBody>
           <a:bodyPr vert="horz" lIns="91440" tIns="45720" rIns="91440" bIns="45720" rtlCol="0" anchor="ctr"/>
           <a:lstStyle>
-            <a:lvl1pPr algn="l">
-              <a:defRPr sz="1200">
+            <a:lvl1pPr algn="r">
+              <a:defRPr sz="1050" b="0">
                 <a:solidFill>
-                  <a:schemeClr val="tx1">
-                    <a:tint val="75000"/>
+                  <a:schemeClr val="tx2">
+                    <a:lumMod val="20000"/>
+                    <a:lumOff val="80000"/>
                   </a:schemeClr>
                 </a:solidFill>
               </a:defRPr>
@@ -2752,7 +2962,7 @@
           <a:p>
             <a:fld id="{EF687610-B264-4EE2-9162-558FC9B97517}" type="datetimeFigureOut">
               <a:rPr lang="en-US" smtClean="0"/>
-              <a:t>5/5/2014</a:t>
+              <a:t>2014-05-05</a:t>
             </a:fld>
             <a:endParaRPr lang="en-US"/>
           </a:p>
@@ -2769,9 +2979,9 @@
           </p:nvPr>
         </p:nvSpPr>
         <p:spPr>
-          <a:xfrm>
-            <a:off x="3124200" y="6356350"/>
-            <a:ext cx="2895600" cy="365125"/>
+          <a:xfrm rot="16200000">
+            <a:off x="6993255" y="4092178"/>
+            <a:ext cx="3581400" cy="273844"/>
           </a:xfrm>
           <a:prstGeom prst="rect">
             <a:avLst/>
@@ -2780,11 +2990,12 @@
         <p:txBody>
           <a:bodyPr vert="horz" lIns="91440" tIns="45720" rIns="91440" bIns="45720" rtlCol="0" anchor="ctr"/>
           <a:lstStyle>
-            <a:lvl1pPr algn="ctr">
-              <a:defRPr sz="1200">
+            <a:lvl1pPr algn="l">
+              <a:defRPr sz="1050">
                 <a:solidFill>
-                  <a:schemeClr val="tx1">
-                    <a:tint val="75000"/>
+                  <a:schemeClr val="tx2">
+                    <a:lumMod val="20000"/>
+                    <a:lumOff val="80000"/>
                   </a:schemeClr>
                 </a:solidFill>
               </a:defRPr>
@@ -2807,21 +3018,24 @@
         </p:nvSpPr>
         <p:spPr>
           <a:xfrm>
-            <a:off x="6553200" y="6356350"/>
-            <a:ext cx="2133600" cy="365125"/>
+            <a:off x="8441055" y="6172201"/>
+            <a:ext cx="685800" cy="593725"/>
           </a:xfrm>
           <a:prstGeom prst="rect">
             <a:avLst/>
           </a:prstGeom>
         </p:spPr>
         <p:txBody>
-          <a:bodyPr vert="horz" lIns="91440" tIns="45720" rIns="91440" bIns="45720" rtlCol="0" anchor="ctr"/>
+          <a:bodyPr vert="horz" lIns="27432" tIns="45720" rIns="27432" bIns="45720" rtlCol="0" anchor="ctr">
+            <a:normAutofit/>
+          </a:bodyPr>
           <a:lstStyle>
-            <a:lvl1pPr algn="r">
-              <a:defRPr sz="1200">
+            <a:lvl1pPr algn="ctr">
+              <a:defRPr sz="3200">
                 <a:solidFill>
-                  <a:schemeClr val="tx1">
-                    <a:tint val="75000"/>
+                  <a:schemeClr val="tx2">
+                    <a:lumMod val="60000"/>
+                    <a:lumOff val="40000"/>
                   </a:schemeClr>
                 </a:solidFill>
               </a:defRPr>
@@ -2839,32 +3053,35 @@
     </p:spTree>
     <p:extLst>
       <p:ext uri="{BB962C8B-B14F-4D97-AF65-F5344CB8AC3E}">
-        <p14:creationId xmlns:p14="http://schemas.microsoft.com/office/powerpoint/2010/main" val="1876225900"/>
+        <p14:creationId xmlns:p14="http://schemas.microsoft.com/office/powerpoint/2010/main" val="272991119"/>
       </p:ext>
     </p:extLst>
   </p:cSld>
   <p:clrMap bg1="lt1" tx1="dk1" bg2="lt2" tx2="dk2" accent1="accent1" accent2="accent2" accent3="accent3" accent4="accent4" accent5="accent5" accent6="accent6" hlink="hlink" folHlink="folHlink"/>
   <p:sldLayoutIdLst>
-    <p:sldLayoutId id="2147483649" r:id="rId1"/>
-    <p:sldLayoutId id="2147483650" r:id="rId2"/>
-    <p:sldLayoutId id="2147483651" r:id="rId3"/>
-    <p:sldLayoutId id="2147483652" r:id="rId4"/>
-    <p:sldLayoutId id="2147483653" r:id="rId5"/>
-    <p:sldLayoutId id="2147483654" r:id="rId6"/>
-    <p:sldLayoutId id="2147483655" r:id="rId7"/>
-    <p:sldLayoutId id="2147483656" r:id="rId8"/>
-    <p:sldLayoutId id="2147483657" r:id="rId9"/>
-    <p:sldLayoutId id="2147483658" r:id="rId10"/>
-    <p:sldLayoutId id="2147483659" r:id="rId11"/>
+    <p:sldLayoutId id="2147483661" r:id="rId1"/>
+    <p:sldLayoutId id="2147483662" r:id="rId2"/>
+    <p:sldLayoutId id="2147483663" r:id="rId3"/>
+    <p:sldLayoutId id="2147483664" r:id="rId4"/>
+    <p:sldLayoutId id="2147483665" r:id="rId5"/>
+    <p:sldLayoutId id="2147483666" r:id="rId6"/>
+    <p:sldLayoutId id="2147483667" r:id="rId7"/>
+    <p:sldLayoutId id="2147483668" r:id="rId8"/>
+    <p:sldLayoutId id="2147483669" r:id="rId9"/>
+    <p:sldLayoutId id="2147483670" r:id="rId10"/>
+    <p:sldLayoutId id="2147483671" r:id="rId11"/>
   </p:sldLayoutIdLst>
   <p:txStyles>
     <p:titleStyle>
-      <a:lvl1pPr algn="ctr" defTabSz="914400" rtl="0" eaLnBrk="1" latinLnBrk="0" hangingPunct="1">
+      <a:lvl1pPr algn="l" defTabSz="914400" rtl="0" eaLnBrk="1" latinLnBrk="0" hangingPunct="1">
+        <a:lnSpc>
+          <a:spcPct val="90000"/>
+        </a:lnSpc>
         <a:spcBef>
           <a:spcPct val="0"/>
         </a:spcBef>
         <a:buNone/>
-        <a:defRPr sz="4400" kern="1200">
+        <a:defRPr sz="4000" kern="1200" spc="-50" baseline="0">
           <a:solidFill>
             <a:schemeClr val="tx1"/>
           </a:solidFill>
@@ -2875,13 +3092,23 @@
       </a:lvl1pPr>
     </p:titleStyle>
     <p:bodyStyle>
-      <a:lvl1pPr marL="342900" indent="-342900" algn="l" defTabSz="914400" rtl="0" eaLnBrk="1" latinLnBrk="0" hangingPunct="1">
+      <a:lvl1pPr marL="182880" indent="-182880" algn="l" defTabSz="914400" rtl="0" eaLnBrk="1" latinLnBrk="0" hangingPunct="1">
+        <a:lnSpc>
+          <a:spcPct val="95000"/>
+        </a:lnSpc>
         <a:spcBef>
-          <a:spcPct val="20000"/>
+          <a:spcPts val="1400"/>
         </a:spcBef>
-        <a:buFont typeface="Arial" panose="020B0604020202020204" pitchFamily="34" charset="0"/>
+        <a:spcAft>
+          <a:spcPts val="200"/>
+        </a:spcAft>
+        <a:buClr>
+          <a:schemeClr val="accent1"/>
+        </a:buClr>
+        <a:buSzPct val="80000"/>
+        <a:buFont typeface="Arial" pitchFamily="34" charset="0"/>
         <a:buChar char="•"/>
-        <a:defRPr sz="3200" kern="1200">
+        <a:defRPr sz="1800" kern="1200" spc="10" baseline="0">
           <a:solidFill>
             <a:schemeClr val="tx1"/>
           </a:solidFill>
@@ -2890,120 +3117,216 @@
           <a:cs typeface="+mn-cs"/>
         </a:defRPr>
       </a:lvl1pPr>
-      <a:lvl2pPr marL="742950" indent="-285750" algn="l" defTabSz="914400" rtl="0" eaLnBrk="1" latinLnBrk="0" hangingPunct="1">
+      <a:lvl2pPr marL="457200" indent="-182880" algn="l" defTabSz="914400" rtl="0" eaLnBrk="1" latinLnBrk="0" hangingPunct="1">
+        <a:lnSpc>
+          <a:spcPct val="90000"/>
+        </a:lnSpc>
         <a:spcBef>
-          <a:spcPct val="20000"/>
+          <a:spcPts val="300"/>
         </a:spcBef>
-        <a:buFont typeface="Arial" panose="020B0604020202020204" pitchFamily="34" charset="0"/>
-        <a:buChar char="–"/>
-        <a:defRPr sz="2800" kern="1200">
+        <a:spcAft>
+          <a:spcPts val="300"/>
+        </a:spcAft>
+        <a:buClr>
+          <a:schemeClr val="accent1"/>
+        </a:buClr>
+        <a:buFont typeface="Wingdings 2" pitchFamily="18" charset="2"/>
+        <a:buChar char=""/>
+        <a:defRPr sz="1600" kern="1200">
           <a:solidFill>
-            <a:schemeClr val="tx1"/>
+            <a:schemeClr val="tx1">
+              <a:lumMod val="85000"/>
+              <a:lumOff val="15000"/>
+            </a:schemeClr>
           </a:solidFill>
           <a:latin typeface="+mn-lt"/>
           <a:ea typeface="+mn-ea"/>
           <a:cs typeface="+mn-cs"/>
         </a:defRPr>
       </a:lvl2pPr>
-      <a:lvl3pPr marL="1143000" indent="-228600" algn="l" defTabSz="914400" rtl="0" eaLnBrk="1" latinLnBrk="0" hangingPunct="1">
+      <a:lvl3pPr marL="731520" indent="-182880" algn="l" defTabSz="914400" rtl="0" eaLnBrk="1" latinLnBrk="0" hangingPunct="1">
+        <a:lnSpc>
+          <a:spcPct val="90000"/>
+        </a:lnSpc>
         <a:spcBef>
-          <a:spcPct val="20000"/>
+          <a:spcPts val="300"/>
         </a:spcBef>
-        <a:buFont typeface="Arial" panose="020B0604020202020204" pitchFamily="34" charset="0"/>
-        <a:buChar char="•"/>
-        <a:defRPr sz="2400" kern="1200">
+        <a:spcAft>
+          <a:spcPts val="300"/>
+        </a:spcAft>
+        <a:buClr>
+          <a:schemeClr val="accent1"/>
+        </a:buClr>
+        <a:buFont typeface="Wingdings 2" pitchFamily="18" charset="2"/>
+        <a:buChar char=""/>
+        <a:defRPr sz="1400" kern="1200">
           <a:solidFill>
-            <a:schemeClr val="tx1"/>
+            <a:schemeClr val="tx1">
+              <a:lumMod val="85000"/>
+              <a:lumOff val="15000"/>
+            </a:schemeClr>
           </a:solidFill>
           <a:latin typeface="+mn-lt"/>
           <a:ea typeface="+mn-ea"/>
           <a:cs typeface="+mn-cs"/>
         </a:defRPr>
       </a:lvl3pPr>
-      <a:lvl4pPr marL="1600200" indent="-228600" algn="l" defTabSz="914400" rtl="0" eaLnBrk="1" latinLnBrk="0" hangingPunct="1">
+      <a:lvl4pPr marL="1005840" indent="-182880" algn="l" defTabSz="914400" rtl="0" eaLnBrk="1" latinLnBrk="0" hangingPunct="1">
+        <a:lnSpc>
+          <a:spcPct val="90000"/>
+        </a:lnSpc>
         <a:spcBef>
-          <a:spcPct val="20000"/>
+          <a:spcPts val="300"/>
         </a:spcBef>
-        <a:buFont typeface="Arial" panose="020B0604020202020204" pitchFamily="34" charset="0"/>
-        <a:buChar char="–"/>
-        <a:defRPr sz="2000" kern="1200">
+        <a:spcAft>
+          <a:spcPts val="300"/>
+        </a:spcAft>
+        <a:buClr>
+          <a:schemeClr val="accent1"/>
+        </a:buClr>
+        <a:buFont typeface="Wingdings 2" pitchFamily="18" charset="2"/>
+        <a:buChar char=""/>
+        <a:defRPr sz="1400" kern="1200">
           <a:solidFill>
-            <a:schemeClr val="tx1"/>
+            <a:schemeClr val="tx1">
+              <a:lumMod val="85000"/>
+              <a:lumOff val="15000"/>
+            </a:schemeClr>
           </a:solidFill>
           <a:latin typeface="+mn-lt"/>
           <a:ea typeface="+mn-ea"/>
           <a:cs typeface="+mn-cs"/>
         </a:defRPr>
       </a:lvl4pPr>
-      <a:lvl5pPr marL="2057400" indent="-228600" algn="l" defTabSz="914400" rtl="0" eaLnBrk="1" latinLnBrk="0" hangingPunct="1">
+      <a:lvl5pPr marL="1280160" indent="-182880" algn="l" defTabSz="914400" rtl="0" eaLnBrk="1" latinLnBrk="0" hangingPunct="1">
+        <a:lnSpc>
+          <a:spcPct val="90000"/>
+        </a:lnSpc>
         <a:spcBef>
-          <a:spcPct val="20000"/>
+          <a:spcPts val="300"/>
         </a:spcBef>
-        <a:buFont typeface="Arial" panose="020B0604020202020204" pitchFamily="34" charset="0"/>
-        <a:buChar char="»"/>
-        <a:defRPr sz="2000" kern="1200">
+        <a:spcAft>
+          <a:spcPts val="300"/>
+        </a:spcAft>
+        <a:buClr>
+          <a:schemeClr val="accent1"/>
+        </a:buClr>
+        <a:buFont typeface="Wingdings 2" pitchFamily="18" charset="2"/>
+        <a:buChar char=""/>
+        <a:defRPr sz="1400" kern="1200">
           <a:solidFill>
-            <a:schemeClr val="tx1"/>
+            <a:schemeClr val="tx1">
+              <a:lumMod val="85000"/>
+              <a:lumOff val="15000"/>
+            </a:schemeClr>
           </a:solidFill>
           <a:latin typeface="+mn-lt"/>
           <a:ea typeface="+mn-ea"/>
           <a:cs typeface="+mn-cs"/>
         </a:defRPr>
       </a:lvl5pPr>
-      <a:lvl6pPr marL="2514600" indent="-228600" algn="l" defTabSz="914400" rtl="0" eaLnBrk="1" latinLnBrk="0" hangingPunct="1">
+      <a:lvl6pPr marL="1600000" indent="-228600" algn="l" defTabSz="914400" rtl="0" eaLnBrk="1" latinLnBrk="0" hangingPunct="1">
+        <a:lnSpc>
+          <a:spcPct val="90000"/>
+        </a:lnSpc>
         <a:spcBef>
-          <a:spcPct val="20000"/>
+          <a:spcPts val="300"/>
         </a:spcBef>
-        <a:buFont typeface="Arial" panose="020B0604020202020204" pitchFamily="34" charset="0"/>
-        <a:buChar char="•"/>
-        <a:defRPr sz="2000" kern="1200">
+        <a:spcAft>
+          <a:spcPts val="300"/>
+        </a:spcAft>
+        <a:buClr>
+          <a:schemeClr val="accent1"/>
+        </a:buClr>
+        <a:buFont typeface="Wingdings 2" pitchFamily="18" charset="2"/>
+        <a:buChar char=""/>
+        <a:defRPr sz="1400" kern="1200">
           <a:solidFill>
-            <a:schemeClr val="tx1"/>
+            <a:schemeClr val="tx1">
+              <a:lumMod val="85000"/>
+              <a:lumOff val="15000"/>
+            </a:schemeClr>
           </a:solidFill>
           <a:latin typeface="+mn-lt"/>
           <a:ea typeface="+mn-ea"/>
           <a:cs typeface="+mn-cs"/>
         </a:defRPr>
       </a:lvl6pPr>
-      <a:lvl7pPr marL="2971800" indent="-228600" algn="l" defTabSz="914400" rtl="0" eaLnBrk="1" latinLnBrk="0" hangingPunct="1">
+      <a:lvl7pPr marL="1900000" indent="-228600" algn="l" defTabSz="914400" rtl="0" eaLnBrk="1" latinLnBrk="0" hangingPunct="1">
+        <a:lnSpc>
+          <a:spcPct val="90000"/>
+        </a:lnSpc>
         <a:spcBef>
-          <a:spcPct val="20000"/>
+          <a:spcPts val="300"/>
         </a:spcBef>
-        <a:buFont typeface="Arial" panose="020B0604020202020204" pitchFamily="34" charset="0"/>
-        <a:buChar char="•"/>
-        <a:defRPr sz="2000" kern="1200">
+        <a:spcAft>
+          <a:spcPts val="300"/>
+        </a:spcAft>
+        <a:buClr>
+          <a:schemeClr val="accent1"/>
+        </a:buClr>
+        <a:buFont typeface="Wingdings 2" pitchFamily="18" charset="2"/>
+        <a:buChar char=""/>
+        <a:defRPr sz="1400" kern="1200">
           <a:solidFill>
-            <a:schemeClr val="tx1"/>
+            <a:schemeClr val="tx1">
+              <a:lumMod val="85000"/>
+              <a:lumOff val="15000"/>
+            </a:schemeClr>
           </a:solidFill>
           <a:latin typeface="+mn-lt"/>
           <a:ea typeface="+mn-ea"/>
           <a:cs typeface="+mn-cs"/>
         </a:defRPr>
       </a:lvl7pPr>
-      <a:lvl8pPr marL="3429000" indent="-228600" algn="l" defTabSz="914400" rtl="0" eaLnBrk="1" latinLnBrk="0" hangingPunct="1">
+      <a:lvl8pPr marL="2200000" indent="-228600" algn="l" defTabSz="914400" rtl="0" eaLnBrk="1" latinLnBrk="0" hangingPunct="1">
+        <a:lnSpc>
+          <a:spcPct val="90000"/>
+        </a:lnSpc>
         <a:spcBef>
-          <a:spcPct val="20000"/>
+          <a:spcPts val="300"/>
         </a:spcBef>
-        <a:buFont typeface="Arial" panose="020B0604020202020204" pitchFamily="34" charset="0"/>
-        <a:buChar char="•"/>
-        <a:defRPr sz="2000" kern="1200">
+        <a:spcAft>
+          <a:spcPts val="300"/>
+        </a:spcAft>
+        <a:buClr>
+          <a:schemeClr val="accent1"/>
+        </a:buClr>
+        <a:buFont typeface="Wingdings 2" pitchFamily="18" charset="2"/>
+        <a:buChar char=""/>
+        <a:defRPr sz="1400" kern="1200">
           <a:solidFill>
-            <a:schemeClr val="tx1"/>
+            <a:schemeClr val="tx1">
+              <a:lumMod val="85000"/>
+              <a:lumOff val="15000"/>
+            </a:schemeClr>
           </a:solidFill>
           <a:latin typeface="+mn-lt"/>
           <a:ea typeface="+mn-ea"/>
           <a:cs typeface="+mn-cs"/>
         </a:defRPr>
       </a:lvl8pPr>
-      <a:lvl9pPr marL="3886200" indent="-228600" algn="l" defTabSz="914400" rtl="0" eaLnBrk="1" latinLnBrk="0" hangingPunct="1">
+      <a:lvl9pPr marL="2500000" indent="-228600" algn="l" defTabSz="914400" rtl="0" eaLnBrk="1" latinLnBrk="0" hangingPunct="1">
+        <a:lnSpc>
+          <a:spcPct val="90000"/>
+        </a:lnSpc>
         <a:spcBef>
-          <a:spcPct val="20000"/>
+          <a:spcPts val="300"/>
         </a:spcBef>
-        <a:buFont typeface="Arial" panose="020B0604020202020204" pitchFamily="34" charset="0"/>
-        <a:buChar char="•"/>
-        <a:defRPr sz="2000" kern="1200">
+        <a:spcAft>
+          <a:spcPts val="300"/>
+        </a:spcAft>
+        <a:buClr>
+          <a:schemeClr val="accent1"/>
+        </a:buClr>
+        <a:buFont typeface="Wingdings 2" pitchFamily="18" charset="2"/>
+        <a:buChar char=""/>
+        <a:defRPr sz="1400" kern="1200">
           <a:solidFill>
-            <a:schemeClr val="tx1"/>
+            <a:schemeClr val="tx1">
+              <a:lumMod val="85000"/>
+              <a:lumOff val="15000"/>
+            </a:schemeClr>
           </a:solidFill>
           <a:latin typeface="+mn-lt"/>
           <a:ea typeface="+mn-ea"/>
@@ -3179,6 +3502,13 @@
   <p:clrMapOvr>
     <a:masterClrMapping/>
   </p:clrMapOvr>
+  <p:timing>
+    <p:tnLst>
+      <p:par>
+        <p:cTn id="1" dur="indefinite" restart="never" nodeType="tmRoot"/>
+      </p:par>
+    </p:tnLst>
+  </p:timing>
 </p:sld>
 </file>
 
@@ -3216,7 +3546,122 @@
           <a:p>
             <a:r>
               <a:rPr lang="en-US" dirty="0" smtClean="0"/>
-              <a:t>Co-PI Network Analysis</a:t>
+              <a:t>General </a:t>
+            </a:r>
+            <a:r>
+              <a:rPr lang="en-US" dirty="0" smtClean="0"/>
+              <a:t>Statistics</a:t>
+            </a:r>
+            <a:br>
+              <a:rPr lang="en-US" dirty="0" smtClean="0"/>
+            </a:br>
+            <a:r>
+              <a:rPr lang="en-US" dirty="0" smtClean="0"/>
+              <a:t>Funding </a:t>
+            </a:r>
+            <a:r>
+              <a:rPr lang="en-US" dirty="0" smtClean="0"/>
+              <a:t>per PI</a:t>
+            </a:r>
+            <a:endParaRPr lang="en-US" dirty="0"/>
+          </a:p>
+        </p:txBody>
+      </p:sp>
+      <p:pic>
+        <p:nvPicPr>
+          <p:cNvPr id="4" name="Content Placeholder 3"/>
+          <p:cNvPicPr>
+            <a:picLocks noGrp="1" noChangeAspect="1"/>
+          </p:cNvPicPr>
+          <p:nvPr>
+            <p:ph idx="1"/>
+          </p:nvPr>
+        </p:nvPicPr>
+        <p:blipFill>
+          <a:blip r:embed="rId2">
+            <a:extLst>
+              <a:ext uri="{28A0092B-C50C-407E-A947-70E740481C1C}">
+                <a14:useLocalDpi xmlns:a14="http://schemas.microsoft.com/office/drawing/2010/main" val="0"/>
+              </a:ext>
+            </a:extLst>
+          </a:blip>
+          <a:stretch>
+            <a:fillRect/>
+          </a:stretch>
+        </p:blipFill>
+        <p:spPr>
+          <a:xfrm>
+            <a:off x="0" y="1728417"/>
+            <a:ext cx="8215884" cy="4621434"/>
+          </a:xfrm>
+        </p:spPr>
+      </p:pic>
+    </p:spTree>
+    <p:extLst>
+      <p:ext uri="{BB962C8B-B14F-4D97-AF65-F5344CB8AC3E}">
+        <p14:creationId xmlns:p14="http://schemas.microsoft.com/office/powerpoint/2010/main" val="303361286"/>
+      </p:ext>
+    </p:extLst>
+  </p:cSld>
+  <p:clrMapOvr>
+    <a:masterClrMapping/>
+  </p:clrMapOvr>
+  <p:timing>
+    <p:tnLst>
+      <p:par>
+        <p:cTn id="1" dur="indefinite" restart="never" nodeType="tmRoot"/>
+      </p:par>
+    </p:tnLst>
+  </p:timing>
+</p:sld>
+</file>
+
+<file path=ppt/slides/slide11.xml><?xml version="1.0" encoding="utf-8"?>
+<p:sld xmlns:a="http://schemas.openxmlformats.org/drawingml/2006/main" xmlns:r="http://schemas.openxmlformats.org/officeDocument/2006/relationships" xmlns:p="http://schemas.openxmlformats.org/presentationml/2006/main">
+  <p:cSld>
+    <p:spTree>
+      <p:nvGrpSpPr>
+        <p:cNvPr id="1" name=""/>
+        <p:cNvGrpSpPr/>
+        <p:nvPr/>
+      </p:nvGrpSpPr>
+      <p:grpSpPr>
+        <a:xfrm>
+          <a:off x="0" y="0"/>
+          <a:ext cx="0" cy="0"/>
+          <a:chOff x="0" y="0"/>
+          <a:chExt cx="0" cy="0"/>
+        </a:xfrm>
+      </p:grpSpPr>
+      <p:sp>
+        <p:nvSpPr>
+          <p:cNvPr id="2" name="Title 1"/>
+          <p:cNvSpPr>
+            <a:spLocks noGrp="1"/>
+          </p:cNvSpPr>
+          <p:nvPr>
+            <p:ph type="title"/>
+          </p:nvPr>
+        </p:nvSpPr>
+        <p:spPr/>
+        <p:txBody>
+          <a:bodyPr/>
+          <a:lstStyle/>
+          <a:p>
+            <a:r>
+              <a:rPr lang="en-US" dirty="0" smtClean="0"/>
+              <a:t>Network Analysis</a:t>
+            </a:r>
+            <a:r>
+              <a:rPr lang="en-US" dirty="0" smtClean="0"/>
+              <a:t/>
+            </a:r>
+            <a:br>
+              <a:rPr lang="en-US" dirty="0" smtClean="0"/>
+            </a:br>
+            <a:r>
+              <a:rPr lang="en-US" dirty="0" smtClean="0"/>
+              <a:t>Co-PI network</a:t>
             </a:r>
             <a:endParaRPr lang="en-US" dirty="0"/>
           </a:p>
@@ -3315,93 +3760,13 @@
   <p:clrMapOvr>
     <a:masterClrMapping/>
   </p:clrMapOvr>
-</p:sld>
-</file>
-
-<file path=ppt/slides/slide11.xml><?xml version="1.0" encoding="utf-8"?>
-<p:sld xmlns:a="http://schemas.openxmlformats.org/drawingml/2006/main" xmlns:r="http://schemas.openxmlformats.org/officeDocument/2006/relationships" xmlns:p="http://schemas.openxmlformats.org/presentationml/2006/main">
-  <p:cSld>
-    <p:spTree>
-      <p:nvGrpSpPr>
-        <p:cNvPr id="1" name=""/>
-        <p:cNvGrpSpPr/>
-        <p:nvPr/>
-      </p:nvGrpSpPr>
-      <p:grpSpPr>
-        <a:xfrm>
-          <a:off x="0" y="0"/>
-          <a:ext cx="0" cy="0"/>
-          <a:chOff x="0" y="0"/>
-          <a:chExt cx="0" cy="0"/>
-        </a:xfrm>
-      </p:grpSpPr>
-      <p:sp>
-        <p:nvSpPr>
-          <p:cNvPr id="2" name="Title 1"/>
-          <p:cNvSpPr>
-            <a:spLocks noGrp="1"/>
-          </p:cNvSpPr>
-          <p:nvPr>
-            <p:ph type="title"/>
-          </p:nvPr>
-        </p:nvSpPr>
-        <p:spPr/>
-        <p:txBody>
-          <a:bodyPr/>
-          <a:lstStyle/>
-          <a:p>
-            <a:r>
-              <a:rPr lang="en-US" dirty="0" smtClean="0"/>
-              <a:t>Data Visualization</a:t>
-            </a:r>
-            <a:endParaRPr lang="en-US" dirty="0"/>
-          </a:p>
-        </p:txBody>
-      </p:sp>
-      <p:sp>
-        <p:nvSpPr>
-          <p:cNvPr id="3" name="Content Placeholder 2"/>
-          <p:cNvSpPr>
-            <a:spLocks noGrp="1"/>
-          </p:cNvSpPr>
-          <p:nvPr>
-            <p:ph idx="1"/>
-          </p:nvPr>
-        </p:nvSpPr>
-        <p:spPr/>
-        <p:txBody>
-          <a:bodyPr/>
-          <a:lstStyle/>
-          <a:p>
-            <a:r>
-              <a:rPr lang="en-US" dirty="0" smtClean="0">
-                <a:hlinkClick r:id="rId2"/>
-              </a:rPr>
-              <a:t>Co-PI Network</a:t>
-            </a:r>
-            <a:endParaRPr lang="en-US" dirty="0" smtClean="0"/>
-          </a:p>
-          <a:p>
-            <a:r>
-              <a:rPr lang="en-US" dirty="0" smtClean="0">
-                <a:hlinkClick r:id="rId3"/>
-              </a:rPr>
-              <a:t>US Heat Map</a:t>
-            </a:r>
-            <a:endParaRPr lang="en-US" dirty="0"/>
-          </a:p>
-        </p:txBody>
-      </p:sp>
-    </p:spTree>
-    <p:extLst>
-      <p:ext uri="{BB962C8B-B14F-4D97-AF65-F5344CB8AC3E}">
-        <p14:creationId xmlns:p14="http://schemas.microsoft.com/office/powerpoint/2010/main" val="1098443761"/>
-      </p:ext>
-    </p:extLst>
-  </p:cSld>
-  <p:clrMapOvr>
-    <a:masterClrMapping/>
-  </p:clrMapOvr>
+  <p:timing>
+    <p:tnLst>
+      <p:par>
+        <p:cTn id="1" dur="indefinite" restart="never" nodeType="tmRoot"/>
+      </p:par>
+    </p:tnLst>
+  </p:timing>
 </p:sld>
 </file>
 
@@ -3422,6 +3787,39 @@
           <a:chExt cx="0" cy="0"/>
         </a:xfrm>
       </p:grpSpPr>
+      <p:pic>
+        <p:nvPicPr>
+          <p:cNvPr id="6" name="Picture 5">
+            <a:hlinkClick r:id="rId2"/>
+          </p:cNvPr>
+          <p:cNvPicPr>
+            <a:picLocks noChangeAspect="1"/>
+          </p:cNvPicPr>
+          <p:nvPr/>
+        </p:nvPicPr>
+        <p:blipFill>
+          <a:blip r:embed="rId3"/>
+          <a:stretch>
+            <a:fillRect/>
+          </a:stretch>
+        </p:blipFill>
+        <p:spPr>
+          <a:xfrm>
+            <a:off x="189892" y="1691322"/>
+            <a:ext cx="5622714" cy="2895600"/>
+          </a:xfrm>
+          <a:prstGeom prst="rect">
+            <a:avLst/>
+          </a:prstGeom>
+          <a:effectLst>
+            <a:outerShdw blurRad="63500" sx="102000" sy="102000" algn="ctr" rotWithShape="0">
+              <a:prstClr val="black">
+                <a:alpha val="40000"/>
+              </a:prstClr>
+            </a:outerShdw>
+          </a:effectLst>
+        </p:spPr>
+      </p:pic>
       <p:sp>
         <p:nvSpPr>
           <p:cNvPr id="2" name="Title 1"/>
@@ -3439,63 +3837,76 @@
           <a:p>
             <a:r>
               <a:rPr lang="en-US" dirty="0" smtClean="0"/>
-              <a:t>Grant Clustering</a:t>
+              <a:t>Network Analysis</a:t>
+            </a:r>
+            <a:br>
+              <a:rPr lang="en-US" dirty="0" smtClean="0"/>
+            </a:br>
+            <a:r>
+              <a:rPr lang="en-US" dirty="0" smtClean="0"/>
+              <a:t>Data </a:t>
+            </a:r>
+            <a:r>
+              <a:rPr lang="en-US" dirty="0"/>
+              <a:t>v</a:t>
+            </a:r>
+            <a:r>
+              <a:rPr lang="en-US" dirty="0" smtClean="0"/>
+              <a:t>isualization</a:t>
             </a:r>
             <a:endParaRPr lang="en-US" dirty="0"/>
           </a:p>
         </p:txBody>
       </p:sp>
-      <p:sp>
-        <p:nvSpPr>
-          <p:cNvPr id="3" name="Content Placeholder 2"/>
-          <p:cNvSpPr>
-            <a:spLocks noGrp="1"/>
-          </p:cNvSpPr>
-          <p:nvPr>
-            <p:ph idx="1"/>
-          </p:nvPr>
-        </p:nvSpPr>
-        <p:spPr/>
-        <p:txBody>
-          <a:bodyPr/>
-          <a:lstStyle/>
-          <a:p>
-            <a:r>
-              <a:rPr lang="en-US" dirty="0" smtClean="0"/>
-              <a:t>50</a:t>
-            </a:r>
-            <a:r>
-              <a:rPr lang="en-US" baseline="30000" dirty="0" smtClean="0"/>
-              <a:t>th</a:t>
-            </a:r>
-            <a:r>
-              <a:rPr lang="en-US" dirty="0" smtClean="0"/>
-              <a:t> of dataset</a:t>
-            </a:r>
-          </a:p>
-          <a:p>
-            <a:pPr lvl="1"/>
-            <a:r>
-              <a:rPr lang="en-US" dirty="0" smtClean="0"/>
-              <a:t>Equal distribution of </a:t>
-            </a:r>
-            <a:r>
-              <a:rPr lang="en-US" dirty="0" smtClean="0"/>
-              <a:t>years</a:t>
-            </a:r>
-          </a:p>
-        </p:txBody>
-      </p:sp>
+      <p:pic>
+        <p:nvPicPr>
+          <p:cNvPr id="4" name="Picture 3">
+            <a:hlinkClick r:id="rId4"/>
+          </p:cNvPr>
+          <p:cNvPicPr>
+            <a:picLocks noChangeAspect="1"/>
+          </p:cNvPicPr>
+          <p:nvPr/>
+        </p:nvPicPr>
+        <p:blipFill rotWithShape="1">
+          <a:blip r:embed="rId5"/>
+          <a:srcRect l="3828" t="2940" r="3828" b="1961"/>
+          <a:stretch/>
+        </p:blipFill>
+        <p:spPr>
+          <a:xfrm>
+            <a:off x="5029200" y="3429000"/>
+            <a:ext cx="3279190" cy="3245729"/>
+          </a:xfrm>
+          <a:prstGeom prst="rect">
+            <a:avLst/>
+          </a:prstGeom>
+          <a:effectLst>
+            <a:outerShdw blurRad="63500" sx="102000" sy="102000" algn="ctr" rotWithShape="0">
+              <a:prstClr val="black">
+                <a:alpha val="40000"/>
+              </a:prstClr>
+            </a:outerShdw>
+          </a:effectLst>
+        </p:spPr>
+      </p:pic>
     </p:spTree>
     <p:extLst>
       <p:ext uri="{BB962C8B-B14F-4D97-AF65-F5344CB8AC3E}">
-        <p14:creationId xmlns:p14="http://schemas.microsoft.com/office/powerpoint/2010/main" val="4214371025"/>
+        <p14:creationId xmlns:p14="http://schemas.microsoft.com/office/powerpoint/2010/main" val="1098443761"/>
       </p:ext>
     </p:extLst>
   </p:cSld>
   <p:clrMapOvr>
     <a:masterClrMapping/>
   </p:clrMapOvr>
+  <p:timing>
+    <p:tnLst>
+      <p:par>
+        <p:cTn id="1" dur="indefinite" restart="never" nodeType="tmRoot"/>
+      </p:par>
+    </p:tnLst>
+  </p:timing>
 </p:sld>
 </file>
 
@@ -3533,51 +3944,86 @@
           <a:p>
             <a:r>
               <a:rPr lang="en-US" dirty="0" smtClean="0"/>
-              <a:t>Grant Clustering</a:t>
+              <a:t>Clustering</a:t>
+            </a:r>
+            <a:br>
+              <a:rPr lang="en-US" dirty="0" smtClean="0"/>
+            </a:br>
+            <a:r>
+              <a:rPr lang="en-US" dirty="0" smtClean="0"/>
+              <a:t>Grants by Keywords</a:t>
             </a:r>
             <a:endParaRPr lang="en-US" dirty="0"/>
           </a:p>
         </p:txBody>
       </p:sp>
-      <p:pic>
-        <p:nvPicPr>
-          <p:cNvPr id="4" name="Content Placeholder 3"/>
-          <p:cNvPicPr>
-            <a:picLocks noGrp="1" noChangeAspect="1"/>
-          </p:cNvPicPr>
+      <p:sp>
+        <p:nvSpPr>
+          <p:cNvPr id="3" name="Content Placeholder 2"/>
+          <p:cNvSpPr>
+            <a:spLocks noGrp="1"/>
+          </p:cNvSpPr>
           <p:nvPr>
             <p:ph idx="1"/>
           </p:nvPr>
-        </p:nvPicPr>
-        <p:blipFill>
-          <a:blip r:embed="rId2">
-            <a:extLst>
-              <a:ext uri="{28A0092B-C50C-407E-A947-70E740481C1C}">
-                <a14:useLocalDpi xmlns:a14="http://schemas.microsoft.com/office/drawing/2010/main" val="0"/>
-              </a:ext>
-            </a:extLst>
-          </a:blip>
-          <a:stretch>
-            <a:fillRect/>
-          </a:stretch>
-        </p:blipFill>
-        <p:spPr>
-          <a:xfrm>
-            <a:off x="548922" y="1600200"/>
-            <a:ext cx="8046156" cy="4525963"/>
-          </a:xfrm>
-        </p:spPr>
-      </p:pic>
+        </p:nvSpPr>
+        <p:spPr/>
+        <p:txBody>
+          <a:bodyPr/>
+          <a:lstStyle/>
+          <a:p>
+            <a:r>
+              <a:rPr lang="en-US" dirty="0" smtClean="0"/>
+              <a:t>50</a:t>
+            </a:r>
+            <a:r>
+              <a:rPr lang="en-US" baseline="30000" dirty="0" smtClean="0"/>
+              <a:t>th</a:t>
+            </a:r>
+            <a:r>
+              <a:rPr lang="en-US" dirty="0" smtClean="0"/>
+              <a:t> of dataset</a:t>
+            </a:r>
+          </a:p>
+          <a:p>
+            <a:pPr lvl="1"/>
+            <a:r>
+              <a:rPr lang="en-US" dirty="0" smtClean="0"/>
+              <a:t>Equal distribution of years</a:t>
+            </a:r>
+            <a:endParaRPr lang="en-US" dirty="0"/>
+          </a:p>
+          <a:p>
+            <a:r>
+              <a:rPr lang="en-US" dirty="0" smtClean="0"/>
+              <a:t>Used Deep Autoencoder Network to reduce from 438-&gt;200-&gt;100-&gt;50-&gt;25-&gt;2</a:t>
+            </a:r>
+          </a:p>
+          <a:p>
+            <a:r>
+              <a:rPr lang="en-US" dirty="0" smtClean="0"/>
+              <a:t>Each grant now represented by 2 features, x and y, and can be plotted</a:t>
+            </a:r>
+          </a:p>
+        </p:txBody>
+      </p:sp>
     </p:spTree>
     <p:extLst>
       <p:ext uri="{BB962C8B-B14F-4D97-AF65-F5344CB8AC3E}">
-        <p14:creationId xmlns:p14="http://schemas.microsoft.com/office/powerpoint/2010/main" val="2112743538"/>
+        <p14:creationId xmlns:p14="http://schemas.microsoft.com/office/powerpoint/2010/main" val="4214371025"/>
       </p:ext>
     </p:extLst>
   </p:cSld>
   <p:clrMapOvr>
     <a:masterClrMapping/>
   </p:clrMapOvr>
+  <p:timing>
+    <p:tnLst>
+      <p:par>
+        <p:cTn id="1" dur="indefinite" restart="never" nodeType="tmRoot"/>
+      </p:par>
+    </p:tnLst>
+  </p:timing>
 </p:sld>
 </file>
 
@@ -3615,6 +4061,102 @@
           <a:p>
             <a:r>
               <a:rPr lang="en-US" dirty="0" smtClean="0"/>
+              <a:t>Clustering</a:t>
+            </a:r>
+            <a:br>
+              <a:rPr lang="en-US" dirty="0" smtClean="0"/>
+            </a:br>
+            <a:r>
+              <a:rPr lang="en-US" dirty="0" smtClean="0"/>
+              <a:t>Grants by Keywords</a:t>
+            </a:r>
+            <a:endParaRPr lang="en-US" dirty="0"/>
+          </a:p>
+        </p:txBody>
+      </p:sp>
+      <p:pic>
+        <p:nvPicPr>
+          <p:cNvPr id="4" name="Content Placeholder 3"/>
+          <p:cNvPicPr>
+            <a:picLocks noGrp="1" noChangeAspect="1"/>
+          </p:cNvPicPr>
+          <p:nvPr>
+            <p:ph idx="1"/>
+          </p:nvPr>
+        </p:nvPicPr>
+        <p:blipFill>
+          <a:blip r:embed="rId2">
+            <a:extLst>
+              <a:ext uri="{28A0092B-C50C-407E-A947-70E740481C1C}">
+                <a14:useLocalDpi xmlns:a14="http://schemas.microsoft.com/office/drawing/2010/main" val="0"/>
+              </a:ext>
+            </a:extLst>
+          </a:blip>
+          <a:stretch>
+            <a:fillRect/>
+          </a:stretch>
+        </p:blipFill>
+        <p:spPr>
+          <a:xfrm>
+            <a:off x="44891" y="1728417"/>
+            <a:ext cx="8170993" cy="4596183"/>
+          </a:xfrm>
+        </p:spPr>
+      </p:pic>
+    </p:spTree>
+    <p:extLst>
+      <p:ext uri="{BB962C8B-B14F-4D97-AF65-F5344CB8AC3E}">
+        <p14:creationId xmlns:p14="http://schemas.microsoft.com/office/powerpoint/2010/main" val="2112743538"/>
+      </p:ext>
+    </p:extLst>
+  </p:cSld>
+  <p:clrMapOvr>
+    <a:masterClrMapping/>
+  </p:clrMapOvr>
+  <p:timing>
+    <p:tnLst>
+      <p:par>
+        <p:cTn id="1" dur="indefinite" restart="never" nodeType="tmRoot"/>
+      </p:par>
+    </p:tnLst>
+  </p:timing>
+</p:sld>
+</file>
+
+<file path=ppt/slides/slide15.xml><?xml version="1.0" encoding="utf-8"?>
+<p:sld xmlns:a="http://schemas.openxmlformats.org/drawingml/2006/main" xmlns:r="http://schemas.openxmlformats.org/officeDocument/2006/relationships" xmlns:p="http://schemas.openxmlformats.org/presentationml/2006/main">
+  <p:cSld>
+    <p:spTree>
+      <p:nvGrpSpPr>
+        <p:cNvPr id="1" name=""/>
+        <p:cNvGrpSpPr/>
+        <p:nvPr/>
+      </p:nvGrpSpPr>
+      <p:grpSpPr>
+        <a:xfrm>
+          <a:off x="0" y="0"/>
+          <a:ext cx="0" cy="0"/>
+          <a:chOff x="0" y="0"/>
+          <a:chExt cx="0" cy="0"/>
+        </a:xfrm>
+      </p:grpSpPr>
+      <p:sp>
+        <p:nvSpPr>
+          <p:cNvPr id="2" name="Title 1"/>
+          <p:cNvSpPr>
+            <a:spLocks noGrp="1"/>
+          </p:cNvSpPr>
+          <p:nvPr>
+            <p:ph type="title"/>
+          </p:nvPr>
+        </p:nvSpPr>
+        <p:spPr/>
+        <p:txBody>
+          <a:bodyPr/>
+          <a:lstStyle/>
+          <a:p>
+            <a:r>
+              <a:rPr lang="en-US" dirty="0" smtClean="0"/>
               <a:t>References</a:t>
             </a:r>
             <a:endParaRPr lang="en-US" dirty="0"/>
@@ -3674,6 +4216,13 @@
   <p:clrMapOvr>
     <a:masterClrMapping/>
   </p:clrMapOvr>
+  <p:timing>
+    <p:tnLst>
+      <p:par>
+        <p:cTn id="1" dur="indefinite" restart="never" nodeType="tmRoot"/>
+      </p:par>
+    </p:tnLst>
+  </p:timing>
 </p:sld>
 </file>
 
@@ -3711,7 +4260,7 @@
           <a:p>
             <a:r>
               <a:rPr lang="en-US" dirty="0" smtClean="0"/>
-              <a:t>Data Sources</a:t>
+              <a:t>Agenda</a:t>
             </a:r>
             <a:endParaRPr lang="en-US" dirty="0"/>
           </a:p>
@@ -3734,13 +4283,131 @@
           <a:p>
             <a:r>
               <a:rPr lang="en-US" dirty="0" smtClean="0"/>
-              <a:t>~2.2 million </a:t>
-            </a:r>
-            <a:r>
-              <a:rPr lang="en-US" dirty="0" smtClean="0"/>
-              <a:t>NIH grants</a:t>
-            </a:r>
-            <a:endParaRPr lang="en-US" dirty="0" smtClean="0"/>
+              <a:t>Data overview – NIH grants data</a:t>
+            </a:r>
+          </a:p>
+          <a:p>
+            <a:r>
+              <a:rPr lang="en-US" dirty="0" smtClean="0"/>
+              <a:t>Database ERD</a:t>
+            </a:r>
+          </a:p>
+          <a:p>
+            <a:r>
+              <a:rPr lang="en-US" dirty="0" smtClean="0"/>
+              <a:t>General statistics</a:t>
+            </a:r>
+          </a:p>
+          <a:p>
+            <a:r>
+              <a:rPr lang="en-US" dirty="0" smtClean="0"/>
+              <a:t>Network Analysis</a:t>
+            </a:r>
+          </a:p>
+          <a:p>
+            <a:r>
+              <a:rPr lang="en-US" dirty="0" smtClean="0"/>
+              <a:t>Geospatial representation of data</a:t>
+            </a:r>
+          </a:p>
+          <a:p>
+            <a:r>
+              <a:rPr lang="en-US" dirty="0" smtClean="0"/>
+              <a:t>Feature reduction for clustering</a:t>
+            </a:r>
+          </a:p>
+          <a:p>
+            <a:r>
+              <a:rPr lang="en-US" dirty="0" smtClean="0"/>
+              <a:t>References</a:t>
+            </a:r>
+            <a:endParaRPr lang="en-US" dirty="0"/>
+          </a:p>
+        </p:txBody>
+      </p:sp>
+    </p:spTree>
+    <p:extLst>
+      <p:ext uri="{BB962C8B-B14F-4D97-AF65-F5344CB8AC3E}">
+        <p14:creationId xmlns:p14="http://schemas.microsoft.com/office/powerpoint/2010/main" val="4051134079"/>
+      </p:ext>
+    </p:extLst>
+  </p:cSld>
+  <p:clrMapOvr>
+    <a:masterClrMapping/>
+  </p:clrMapOvr>
+  <p:timing>
+    <p:tnLst>
+      <p:par>
+        <p:cTn id="1" dur="indefinite" restart="never" nodeType="tmRoot"/>
+      </p:par>
+    </p:tnLst>
+  </p:timing>
+</p:sld>
+</file>
+
+<file path=ppt/slides/slide3.xml><?xml version="1.0" encoding="utf-8"?>
+<p:sld xmlns:a="http://schemas.openxmlformats.org/drawingml/2006/main" xmlns:r="http://schemas.openxmlformats.org/officeDocument/2006/relationships" xmlns:p="http://schemas.openxmlformats.org/presentationml/2006/main">
+  <p:cSld>
+    <p:spTree>
+      <p:nvGrpSpPr>
+        <p:cNvPr id="1" name=""/>
+        <p:cNvGrpSpPr/>
+        <p:nvPr/>
+      </p:nvGrpSpPr>
+      <p:grpSpPr>
+        <a:xfrm>
+          <a:off x="0" y="0"/>
+          <a:ext cx="0" cy="0"/>
+          <a:chOff x="0" y="0"/>
+          <a:chExt cx="0" cy="0"/>
+        </a:xfrm>
+      </p:grpSpPr>
+      <p:sp>
+        <p:nvSpPr>
+          <p:cNvPr id="2" name="Title 1"/>
+          <p:cNvSpPr>
+            <a:spLocks noGrp="1"/>
+          </p:cNvSpPr>
+          <p:nvPr>
+            <p:ph type="title"/>
+          </p:nvPr>
+        </p:nvSpPr>
+        <p:spPr/>
+        <p:txBody>
+          <a:bodyPr/>
+          <a:lstStyle/>
+          <a:p>
+            <a:r>
+              <a:rPr lang="en-US" dirty="0" smtClean="0"/>
+              <a:t>Data </a:t>
+            </a:r>
+            <a:r>
+              <a:rPr lang="en-US" dirty="0" smtClean="0"/>
+              <a:t>overview</a:t>
+            </a:r>
+            <a:endParaRPr lang="en-US" dirty="0"/>
+          </a:p>
+        </p:txBody>
+      </p:sp>
+      <p:sp>
+        <p:nvSpPr>
+          <p:cNvPr id="3" name="Content Placeholder 2"/>
+          <p:cNvSpPr>
+            <a:spLocks noGrp="1"/>
+          </p:cNvSpPr>
+          <p:nvPr>
+            <p:ph idx="1"/>
+          </p:nvPr>
+        </p:nvSpPr>
+        <p:spPr/>
+        <p:txBody>
+          <a:bodyPr/>
+          <a:lstStyle/>
+          <a:p>
+            <a:r>
+              <a:rPr lang="en-US" dirty="0" smtClean="0"/>
+              <a:t>~2.2 million NIH grants</a:t>
+            </a:r>
           </a:p>
           <a:p>
             <a:r>
@@ -3779,10 +4446,17 @@
   <p:clrMapOvr>
     <a:masterClrMapping/>
   </p:clrMapOvr>
+  <p:timing>
+    <p:tnLst>
+      <p:par>
+        <p:cTn id="1" dur="indefinite" restart="never" nodeType="tmRoot"/>
+      </p:par>
+    </p:tnLst>
+  </p:timing>
 </p:sld>
 </file>
 
-<file path=ppt/slides/slide3.xml><?xml version="1.0" encoding="utf-8"?>
+<file path=ppt/slides/slide4.xml><?xml version="1.0" encoding="utf-8"?>
 <p:sld xmlns:a="http://schemas.openxmlformats.org/drawingml/2006/main" xmlns:r="http://schemas.openxmlformats.org/officeDocument/2006/relationships" xmlns:p="http://schemas.openxmlformats.org/presentationml/2006/main">
   <p:cSld>
     <p:spTree>
@@ -3806,7 +4480,7 @@
             <a:picLocks noGrp="1" noChangeAspect="1"/>
           </p:cNvPicPr>
           <p:nvPr>
-            <p:ph idx="1"/>
+            <p:ph idx="4294967295"/>
           </p:nvPr>
         </p:nvPicPr>
         <p:blipFill>
@@ -3823,11 +4497,51 @@
         </p:blipFill>
         <p:spPr>
           <a:xfrm>
-            <a:off x="1104900" y="82839"/>
-            <a:ext cx="6934200" cy="6622717"/>
+            <a:off x="590550" y="0"/>
+            <a:ext cx="7181850" cy="6858000"/>
           </a:xfrm>
         </p:spPr>
       </p:pic>
+      <p:sp>
+        <p:nvSpPr>
+          <p:cNvPr id="2" name="Title 1"/>
+          <p:cNvSpPr>
+            <a:spLocks noGrp="1"/>
+          </p:cNvSpPr>
+          <p:nvPr>
+            <p:ph type="title"/>
+          </p:nvPr>
+        </p:nvSpPr>
+        <p:spPr>
+          <a:xfrm rot="5400000">
+            <a:off x="5376729" y="3090729"/>
+            <a:ext cx="6848742" cy="685800"/>
+          </a:xfrm>
+        </p:spPr>
+        <p:txBody>
+          <a:bodyPr/>
+          <a:lstStyle/>
+          <a:p>
+            <a:r>
+              <a:rPr lang="en-US" dirty="0" smtClean="0">
+                <a:solidFill>
+                  <a:schemeClr val="bg1">
+                    <a:lumMod val="95000"/>
+                  </a:schemeClr>
+                </a:solidFill>
+              </a:rPr>
+              <a:t>ERD</a:t>
+            </a:r>
+            <a:endParaRPr lang="en-US" dirty="0">
+              <a:solidFill>
+                <a:schemeClr val="bg1">
+                  <a:lumMod val="95000"/>
+                </a:schemeClr>
+              </a:solidFill>
+            </a:endParaRPr>
+          </a:p>
+        </p:txBody>
+      </p:sp>
     </p:spTree>
     <p:extLst>
       <p:ext uri="{BB962C8B-B14F-4D97-AF65-F5344CB8AC3E}">
@@ -3838,88 +4552,13 @@
   <p:clrMapOvr>
     <a:masterClrMapping/>
   </p:clrMapOvr>
-</p:sld>
-</file>
-
-<file path=ppt/slides/slide4.xml><?xml version="1.0" encoding="utf-8"?>
-<p:sld xmlns:a="http://schemas.openxmlformats.org/drawingml/2006/main" xmlns:r="http://schemas.openxmlformats.org/officeDocument/2006/relationships" xmlns:p="http://schemas.openxmlformats.org/presentationml/2006/main">
-  <p:cSld>
-    <p:spTree>
-      <p:nvGrpSpPr>
-        <p:cNvPr id="1" name=""/>
-        <p:cNvGrpSpPr/>
-        <p:nvPr/>
-      </p:nvGrpSpPr>
-      <p:grpSpPr>
-        <a:xfrm>
-          <a:off x="0" y="0"/>
-          <a:ext cx="0" cy="0"/>
-          <a:chOff x="0" y="0"/>
-          <a:chExt cx="0" cy="0"/>
-        </a:xfrm>
-      </p:grpSpPr>
-      <p:sp>
-        <p:nvSpPr>
-          <p:cNvPr id="2" name="Title 1"/>
-          <p:cNvSpPr>
-            <a:spLocks noGrp="1"/>
-          </p:cNvSpPr>
-          <p:nvPr>
-            <p:ph type="title"/>
-          </p:nvPr>
-        </p:nvSpPr>
-        <p:spPr/>
-        <p:txBody>
-          <a:bodyPr/>
-          <a:lstStyle/>
-          <a:p>
-            <a:r>
-              <a:rPr lang="en-US" dirty="0" smtClean="0"/>
-              <a:t>General Statistics: Grants per Year</a:t>
-            </a:r>
-            <a:endParaRPr lang="en-US" dirty="0"/>
-          </a:p>
-        </p:txBody>
-      </p:sp>
-      <p:pic>
-        <p:nvPicPr>
-          <p:cNvPr id="4" name="Content Placeholder 3"/>
-          <p:cNvPicPr>
-            <a:picLocks noGrp="1" noChangeAspect="1"/>
-          </p:cNvPicPr>
-          <p:nvPr>
-            <p:ph idx="1"/>
-          </p:nvPr>
-        </p:nvPicPr>
-        <p:blipFill>
-          <a:blip r:embed="rId2">
-            <a:extLst>
-              <a:ext uri="{28A0092B-C50C-407E-A947-70E740481C1C}">
-                <a14:useLocalDpi xmlns:a14="http://schemas.microsoft.com/office/drawing/2010/main" val="0"/>
-              </a:ext>
-            </a:extLst>
-          </a:blip>
-          <a:stretch>
-            <a:fillRect/>
-          </a:stretch>
-        </p:blipFill>
-        <p:spPr>
-          <a:xfrm>
-            <a:off x="548922" y="1600200"/>
-            <a:ext cx="8046156" cy="4525963"/>
-          </a:xfrm>
-        </p:spPr>
-      </p:pic>
-    </p:spTree>
-    <p:extLst>
-      <p:ext uri="{BB962C8B-B14F-4D97-AF65-F5344CB8AC3E}">
-        <p14:creationId xmlns:p14="http://schemas.microsoft.com/office/powerpoint/2010/main" val="2778609192"/>
-      </p:ext>
-    </p:extLst>
-  </p:cSld>
-  <p:clrMapOvr>
-    <a:masterClrMapping/>
-  </p:clrMapOvr>
+  <p:timing>
+    <p:tnLst>
+      <p:par>
+        <p:cTn id="1" dur="indefinite" restart="never" nodeType="tmRoot"/>
+      </p:par>
+    </p:tnLst>
+  </p:timing>
 </p:sld>
 </file>
 
@@ -3957,7 +4596,30 @@
           <a:p>
             <a:r>
               <a:rPr lang="en-US" dirty="0" smtClean="0"/>
-              <a:t>General Statistics: Grants per City</a:t>
+              <a:t>General </a:t>
+            </a:r>
+            <a:r>
+              <a:rPr lang="en-US" dirty="0"/>
+              <a:t>s</a:t>
+            </a:r>
+            <a:r>
+              <a:rPr lang="en-US" dirty="0" smtClean="0"/>
+              <a:t>tatistics</a:t>
+            </a:r>
+            <a:br>
+              <a:rPr lang="en-US" dirty="0" smtClean="0"/>
+            </a:br>
+            <a:r>
+              <a:rPr lang="en-US" dirty="0" smtClean="0"/>
+              <a:t>Grants </a:t>
+            </a:r>
+            <a:r>
+              <a:rPr lang="en-US" dirty="0" smtClean="0"/>
+              <a:t>per </a:t>
+            </a:r>
+            <a:r>
+              <a:rPr lang="en-US" dirty="0" smtClean="0"/>
+              <a:t>year</a:t>
             </a:r>
             <a:endParaRPr lang="en-US" dirty="0"/>
           </a:p>
@@ -3965,7 +4627,7 @@
       </p:sp>
       <p:pic>
         <p:nvPicPr>
-          <p:cNvPr id="4" name="Content Placeholder 3"/>
+          <p:cNvPr id="5" name="Content Placeholder 4"/>
           <p:cNvPicPr>
             <a:picLocks noGrp="1" noChangeAspect="1"/>
           </p:cNvPicPr>
@@ -3987,21 +4649,28 @@
         </p:blipFill>
         <p:spPr>
           <a:xfrm>
-            <a:off x="548922" y="1600200"/>
-            <a:ext cx="8046156" cy="4525963"/>
+            <a:off x="44891" y="1728417"/>
+            <a:ext cx="8170993" cy="4596183"/>
           </a:xfrm>
         </p:spPr>
       </p:pic>
     </p:spTree>
     <p:extLst>
       <p:ext uri="{BB962C8B-B14F-4D97-AF65-F5344CB8AC3E}">
-        <p14:creationId xmlns:p14="http://schemas.microsoft.com/office/powerpoint/2010/main" val="3563383905"/>
+        <p14:creationId xmlns:p14="http://schemas.microsoft.com/office/powerpoint/2010/main" val="2778609192"/>
       </p:ext>
     </p:extLst>
   </p:cSld>
   <p:clrMapOvr>
     <a:masterClrMapping/>
   </p:clrMapOvr>
+  <p:timing>
+    <p:tnLst>
+      <p:par>
+        <p:cTn id="1" dur="indefinite" restart="never" nodeType="tmRoot"/>
+      </p:par>
+    </p:tnLst>
+  </p:timing>
 </p:sld>
 </file>
 
@@ -4034,14 +4703,35 @@
         </p:nvSpPr>
         <p:spPr/>
         <p:txBody>
-          <a:bodyPr>
-            <a:normAutofit fontScale="90000"/>
-          </a:bodyPr>
-          <a:lstStyle/>
-          <a:p>
-            <a:r>
-              <a:rPr lang="en-US" dirty="0" smtClean="0"/>
-              <a:t>General Statistics: Grants per County</a:t>
+          <a:bodyPr/>
+          <a:lstStyle/>
+          <a:p>
+            <a:r>
+              <a:rPr lang="en-US" dirty="0" smtClean="0"/>
+              <a:t>General </a:t>
+            </a:r>
+            <a:r>
+              <a:rPr lang="en-US" dirty="0"/>
+              <a:t>s</a:t>
+            </a:r>
+            <a:r>
+              <a:rPr lang="en-US" dirty="0" smtClean="0"/>
+              <a:t>tatistics</a:t>
+            </a:r>
+            <a:br>
+              <a:rPr lang="en-US" dirty="0" smtClean="0"/>
+            </a:br>
+            <a:r>
+              <a:rPr lang="en-US" dirty="0" smtClean="0"/>
+              <a:t>Grants </a:t>
+            </a:r>
+            <a:r>
+              <a:rPr lang="en-US" dirty="0" smtClean="0"/>
+              <a:t>per </a:t>
+            </a:r>
+            <a:r>
+              <a:rPr lang="en-US" dirty="0" smtClean="0"/>
+              <a:t>city</a:t>
             </a:r>
             <a:endParaRPr lang="en-US" dirty="0"/>
           </a:p>
@@ -4071,8 +4761,8 @@
         </p:blipFill>
         <p:spPr>
           <a:xfrm>
-            <a:off x="548922" y="1600200"/>
-            <a:ext cx="8046156" cy="4525963"/>
+            <a:off x="44891" y="1728417"/>
+            <a:ext cx="8170993" cy="4596183"/>
           </a:xfrm>
         </p:spPr>
       </p:pic>
@@ -4086,6 +4776,13 @@
   <p:clrMapOvr>
     <a:masterClrMapping/>
   </p:clrMapOvr>
+  <p:timing>
+    <p:tnLst>
+      <p:par>
+        <p:cTn id="1" dur="indefinite" restart="never" nodeType="tmRoot"/>
+      </p:par>
+    </p:tnLst>
+  </p:timing>
 </p:sld>
 </file>
 
@@ -4118,12 +4815,37 @@
         </p:nvSpPr>
         <p:spPr/>
         <p:txBody>
-          <a:bodyPr/>
-          <a:lstStyle/>
-          <a:p>
-            <a:r>
-              <a:rPr lang="en-US" dirty="0" smtClean="0"/>
-              <a:t>General Statistics: Grants per State</a:t>
+          <a:bodyPr>
+            <a:normAutofit/>
+          </a:bodyPr>
+          <a:lstStyle/>
+          <a:p>
+            <a:r>
+              <a:rPr lang="en-US" dirty="0" smtClean="0"/>
+              <a:t>General </a:t>
+            </a:r>
+            <a:r>
+              <a:rPr lang="en-US" dirty="0"/>
+              <a:t>s</a:t>
+            </a:r>
+            <a:r>
+              <a:rPr lang="en-US" dirty="0" smtClean="0"/>
+              <a:t>tatistics</a:t>
+            </a:r>
+            <a:br>
+              <a:rPr lang="en-US" dirty="0" smtClean="0"/>
+            </a:br>
+            <a:r>
+              <a:rPr lang="en-US" dirty="0" smtClean="0"/>
+              <a:t>Grants </a:t>
+            </a:r>
+            <a:r>
+              <a:rPr lang="en-US" dirty="0" smtClean="0"/>
+              <a:t>per </a:t>
+            </a:r>
+            <a:r>
+              <a:rPr lang="en-US" dirty="0" smtClean="0"/>
+              <a:t>county</a:t>
             </a:r>
             <a:endParaRPr lang="en-US" dirty="0"/>
           </a:p>
@@ -4153,8 +4875,8 @@
         </p:blipFill>
         <p:spPr>
           <a:xfrm>
-            <a:off x="548922" y="1600200"/>
-            <a:ext cx="8046156" cy="4525963"/>
+            <a:off x="1" y="1728416"/>
+            <a:ext cx="8215884" cy="4621434"/>
           </a:xfrm>
         </p:spPr>
       </p:pic>
@@ -4168,6 +4890,13 @@
   <p:clrMapOvr>
     <a:masterClrMapping/>
   </p:clrMapOvr>
+  <p:timing>
+    <p:tnLst>
+      <p:par>
+        <p:cTn id="1" dur="indefinite" restart="never" nodeType="tmRoot"/>
+      </p:par>
+    </p:tnLst>
+  </p:timing>
 </p:sld>
 </file>
 
@@ -4205,7 +4934,30 @@
           <a:p>
             <a:r>
               <a:rPr lang="en-US" dirty="0" smtClean="0"/>
-              <a:t>General Statistics: Grants per PI</a:t>
+              <a:t>General </a:t>
+            </a:r>
+            <a:r>
+              <a:rPr lang="en-US" dirty="0"/>
+              <a:t>s</a:t>
+            </a:r>
+            <a:r>
+              <a:rPr lang="en-US" dirty="0" smtClean="0"/>
+              <a:t>tatistics</a:t>
+            </a:r>
+            <a:br>
+              <a:rPr lang="en-US" dirty="0" smtClean="0"/>
+            </a:br>
+            <a:r>
+              <a:rPr lang="en-US" dirty="0" smtClean="0"/>
+              <a:t>Grants </a:t>
+            </a:r>
+            <a:r>
+              <a:rPr lang="en-US" dirty="0" smtClean="0"/>
+              <a:t>per </a:t>
+            </a:r>
+            <a:r>
+              <a:rPr lang="en-US" dirty="0" smtClean="0"/>
+              <a:t>state</a:t>
             </a:r>
             <a:endParaRPr lang="en-US" dirty="0"/>
           </a:p>
@@ -4235,21 +4987,28 @@
         </p:blipFill>
         <p:spPr>
           <a:xfrm>
-            <a:off x="548922" y="1600200"/>
-            <a:ext cx="8046156" cy="4525963"/>
+            <a:off x="44891" y="1728416"/>
+            <a:ext cx="8170993" cy="4596183"/>
           </a:xfrm>
         </p:spPr>
       </p:pic>
     </p:spTree>
     <p:extLst>
       <p:ext uri="{BB962C8B-B14F-4D97-AF65-F5344CB8AC3E}">
-        <p14:creationId xmlns:p14="http://schemas.microsoft.com/office/powerpoint/2010/main" val="3769768111"/>
+        <p14:creationId xmlns:p14="http://schemas.microsoft.com/office/powerpoint/2010/main" val="3563383905"/>
       </p:ext>
     </p:extLst>
   </p:cSld>
   <p:clrMapOvr>
     <a:masterClrMapping/>
   </p:clrMapOvr>
+  <p:timing>
+    <p:tnLst>
+      <p:par>
+        <p:cTn id="1" dur="indefinite" restart="never" nodeType="tmRoot"/>
+      </p:par>
+    </p:tnLst>
+  </p:timing>
 </p:sld>
 </file>
 
@@ -4287,7 +5046,26 @@
           <a:p>
             <a:r>
               <a:rPr lang="en-US" dirty="0" smtClean="0"/>
-              <a:t>General Statistics: Funding per PI</a:t>
+              <a:t>General </a:t>
+            </a:r>
+            <a:r>
+              <a:rPr lang="en-US" dirty="0"/>
+              <a:t>s</a:t>
+            </a:r>
+            <a:r>
+              <a:rPr lang="en-US" dirty="0" smtClean="0"/>
+              <a:t>tatistics</a:t>
+            </a:r>
+            <a:br>
+              <a:rPr lang="en-US" dirty="0" smtClean="0"/>
+            </a:br>
+            <a:r>
+              <a:rPr lang="en-US" dirty="0" smtClean="0"/>
+              <a:t>Grants </a:t>
+            </a:r>
+            <a:r>
+              <a:rPr lang="en-US" dirty="0" smtClean="0"/>
+              <a:t>per PI</a:t>
             </a:r>
             <a:endParaRPr lang="en-US" dirty="0"/>
           </a:p>
@@ -4317,112 +5095,84 @@
         </p:blipFill>
         <p:spPr>
           <a:xfrm>
-            <a:off x="548922" y="1600200"/>
-            <a:ext cx="8046156" cy="4525963"/>
+            <a:off x="0" y="1728417"/>
+            <a:ext cx="8215884" cy="4621434"/>
           </a:xfrm>
         </p:spPr>
       </p:pic>
     </p:spTree>
     <p:extLst>
       <p:ext uri="{BB962C8B-B14F-4D97-AF65-F5344CB8AC3E}">
-        <p14:creationId xmlns:p14="http://schemas.microsoft.com/office/powerpoint/2010/main" val="303361286"/>
+        <p14:creationId xmlns:p14="http://schemas.microsoft.com/office/powerpoint/2010/main" val="3769768111"/>
       </p:ext>
     </p:extLst>
   </p:cSld>
   <p:clrMapOvr>
     <a:masterClrMapping/>
   </p:clrMapOvr>
+  <p:timing>
+    <p:tnLst>
+      <p:par>
+        <p:cTn id="1" dur="indefinite" restart="never" nodeType="tmRoot"/>
+      </p:par>
+    </p:tnLst>
+  </p:timing>
 </p:sld>
 </file>
 
 <file path=ppt/theme/theme1.xml><?xml version="1.0" encoding="utf-8"?>
-<a:theme xmlns:a="http://schemas.openxmlformats.org/drawingml/2006/main" name="Office Theme">
+<a:theme xmlns:a="http://schemas.openxmlformats.org/drawingml/2006/main" name="View">
   <a:themeElements>
-    <a:clrScheme name="Office">
+    <a:clrScheme name="View">
       <a:dk1>
-        <a:sysClr val="windowText" lastClr="000000"/>
+        <a:srgbClr val="000000"/>
       </a:dk1>
       <a:lt1>
-        <a:sysClr val="window" lastClr="FFFFFF"/>
+        <a:srgbClr val="FFFFFF"/>
       </a:lt1>
       <a:dk2>
-        <a:srgbClr val="1F497D"/>
+        <a:srgbClr val="46464A"/>
       </a:dk2>
       <a:lt2>
-        <a:srgbClr val="EEECE1"/>
+        <a:srgbClr val="D6D3CC"/>
       </a:lt2>
       <a:accent1>
-        <a:srgbClr val="4F81BD"/>
+        <a:srgbClr val="6F6F74"/>
       </a:accent1>
       <a:accent2>
-        <a:srgbClr val="C0504D"/>
+        <a:srgbClr val="92A9B9"/>
       </a:accent2>
       <a:accent3>
-        <a:srgbClr val="9BBB59"/>
+        <a:srgbClr val="A7B789"/>
       </a:accent3>
       <a:accent4>
-        <a:srgbClr val="8064A2"/>
+        <a:srgbClr val="B9A489"/>
       </a:accent4>
       <a:accent5>
-        <a:srgbClr val="4BACC6"/>
+        <a:srgbClr val="8D6374"/>
       </a:accent5>
       <a:accent6>
-        <a:srgbClr val="F79646"/>
+        <a:srgbClr val="9B7362"/>
       </a:accent6>
       <a:hlink>
-        <a:srgbClr val="0000FF"/>
+        <a:srgbClr val="67AABF"/>
       </a:hlink>
       <a:folHlink>
-        <a:srgbClr val="800080"/>
+        <a:srgbClr val="ABAFA5"/>
       </a:folHlink>
     </a:clrScheme>
-    <a:fontScheme name="Office">
+    <a:fontScheme name="View">
       <a:majorFont>
-        <a:latin typeface="Calibri"/>
+        <a:latin typeface="Century Schoolbook" panose="02040604050505020304"/>
         <a:ea typeface=""/>
         <a:cs typeface=""/>
-        <a:font script="Jpan" typeface="ＭＳ Ｐゴシック"/>
+        <a:font script="Jpan" typeface="ＭＳ ゴシック"/>
         <a:font script="Hang" typeface="맑은 고딕"/>
         <a:font script="Hans" typeface="宋体"/>
         <a:font script="Hant" typeface="新細明體"/>
-        <a:font script="Arab" typeface="Times New Roman"/>
-        <a:font script="Hebr" typeface="Times New Roman"/>
-        <a:font script="Thai" typeface="Angsana New"/>
-        <a:font script="Ethi" typeface="Nyala"/>
-        <a:font script="Beng" typeface="Vrinda"/>
-        <a:font script="Gujr" typeface="Shruti"/>
-        <a:font script="Khmr" typeface="MoolBoran"/>
-        <a:font script="Knda" typeface="Tunga"/>
-        <a:font script="Guru" typeface="Raavi"/>
-        <a:font script="Cans" typeface="Euphemia"/>
-        <a:font script="Cher" typeface="Plantagenet Cherokee"/>
-        <a:font script="Yiii" typeface="Microsoft Yi Baiti"/>
-        <a:font script="Tibt" typeface="Microsoft Himalaya"/>
-        <a:font script="Thaa" typeface="MV Boli"/>
-        <a:font script="Deva" typeface="Mangal"/>
-        <a:font script="Telu" typeface="Gautami"/>
-        <a:font script="Taml" typeface="Latha"/>
-        <a:font script="Syrc" typeface="Estrangelo Edessa"/>
-        <a:font script="Orya" typeface="Kalinga"/>
-        <a:font script="Mlym" typeface="Kartika"/>
-        <a:font script="Laoo" typeface="DokChampa"/>
-        <a:font script="Sinh" typeface="Iskoola Pota"/>
-        <a:font script="Mong" typeface="Mongolian Baiti"/>
-        <a:font script="Viet" typeface="Times New Roman"/>
-        <a:font script="Uigh" typeface="Microsoft Uighur"/>
-        <a:font script="Geor" typeface="Sylfaen"/>
-      </a:majorFont>
-      <a:minorFont>
-        <a:latin typeface="Calibri"/>
-        <a:ea typeface=""/>
-        <a:cs typeface=""/>
-        <a:font script="Jpan" typeface="ＭＳ Ｐゴシック"/>
-        <a:font script="Hang" typeface="맑은 고딕"/>
-        <a:font script="Hans" typeface="宋体"/>
-        <a:font script="Hant" typeface="新細明體"/>
-        <a:font script="Arab" typeface="Arial"/>
-        <a:font script="Hebr" typeface="Arial"/>
-        <a:font script="Thai" typeface="Cordia New"/>
+        <a:font script="Arab" typeface="Tahoma"/>
+        <a:font script="Hebr" typeface="Gisha"/>
+        <a:font script="Thai" typeface="DilleniaUPC"/>
         <a:font script="Ethi" typeface="Nyala"/>
         <a:font script="Beng" typeface="Vrinda"/>
         <a:font script="Gujr" typeface="Shruti"/>
@@ -4443,110 +5193,97 @@
         <a:font script="Laoo" typeface="DokChampa"/>
         <a:font script="Sinh" typeface="Iskoola Pota"/>
         <a:font script="Mong" typeface="Mongolian Baiti"/>
-        <a:font script="Viet" typeface="Arial"/>
+        <a:font script="Viet" typeface="Tahoma"/>
+        <a:font script="Uigh" typeface="Microsoft Uighur"/>
+        <a:font script="Geor" typeface="Sylfaen"/>
+      </a:majorFont>
+      <a:minorFont>
+        <a:latin typeface="Century Schoolbook" panose="02040604050505020304"/>
+        <a:ea typeface=""/>
+        <a:cs typeface=""/>
+        <a:font script="Jpan" typeface="ＭＳ ゴシック"/>
+        <a:font script="Hang" typeface="맑은 고딕"/>
+        <a:font script="Hans" typeface="宋体"/>
+        <a:font script="Hant" typeface="新細明體"/>
+        <a:font script="Arab" typeface="Tahoma"/>
+        <a:font script="Hebr" typeface="Gisha"/>
+        <a:font script="Thai" typeface="DilleniaUPC"/>
+        <a:font script="Ethi" typeface="Nyala"/>
+        <a:font script="Beng" typeface="Vrinda"/>
+        <a:font script="Gujr" typeface="Shruti"/>
+        <a:font script="Khmr" typeface="DaunPenh"/>
+        <a:font script="Knda" typeface="Tunga"/>
+        <a:font script="Guru" typeface="Raavi"/>
+        <a:font script="Cans" typeface="Euphemia"/>
+        <a:font script="Cher" typeface="Plantagenet Cherokee"/>
+        <a:font script="Yiii" typeface="Microsoft Yi Baiti"/>
+        <a:font script="Tibt" typeface="Microsoft Himalaya"/>
+        <a:font script="Thaa" typeface="MV Boli"/>
+        <a:font script="Deva" typeface="Mangal"/>
+        <a:font script="Telu" typeface="Gautami"/>
+        <a:font script="Taml" typeface="Latha"/>
+        <a:font script="Syrc" typeface="Estrangelo Edessa"/>
+        <a:font script="Orya" typeface="Kalinga"/>
+        <a:font script="Mlym" typeface="Kartika"/>
+        <a:font script="Laoo" typeface="DokChampa"/>
+        <a:font script="Sinh" typeface="Iskoola Pota"/>
+        <a:font script="Mong" typeface="Mongolian Baiti"/>
+        <a:font script="Viet" typeface="Verdana"/>
         <a:font script="Uigh" typeface="Microsoft Uighur"/>
         <a:font script="Geor" typeface="Sylfaen"/>
       </a:minorFont>
     </a:fontScheme>
-    <a:fmtScheme name="Office">
+    <a:fmtScheme name="View">
       <a:fillStyleLst>
         <a:solidFill>
           <a:schemeClr val="phClr"/>
         </a:solidFill>
-        <a:gradFill rotWithShape="1">
-          <a:gsLst>
-            <a:gs pos="0">
-              <a:schemeClr val="phClr">
-                <a:tint val="50000"/>
-                <a:satMod val="300000"/>
-              </a:schemeClr>
-            </a:gs>
-            <a:gs pos="35000">
-              <a:schemeClr val="phClr">
-                <a:tint val="37000"/>
-                <a:satMod val="300000"/>
-              </a:schemeClr>
-            </a:gs>
-            <a:gs pos="100000">
-              <a:schemeClr val="phClr">
-                <a:tint val="15000"/>
-                <a:satMod val="350000"/>
-              </a:schemeClr>
-            </a:gs>
-          </a:gsLst>
-          <a:lin ang="16200000" scaled="1"/>
-        </a:gradFill>
-        <a:gradFill rotWithShape="1">
-          <a:gsLst>
-            <a:gs pos="0">
-              <a:schemeClr val="phClr">
-                <a:shade val="51000"/>
-                <a:satMod val="130000"/>
-              </a:schemeClr>
-            </a:gs>
-            <a:gs pos="80000">
-              <a:schemeClr val="phClr">
-                <a:shade val="93000"/>
-                <a:satMod val="130000"/>
-              </a:schemeClr>
-            </a:gs>
-            <a:gs pos="100000">
-              <a:schemeClr val="phClr">
-                <a:shade val="94000"/>
-                <a:satMod val="135000"/>
-              </a:schemeClr>
-            </a:gs>
-          </a:gsLst>
-          <a:lin ang="16200000" scaled="0"/>
-        </a:gradFill>
+        <a:solidFill>
+          <a:schemeClr val="phClr">
+            <a:tint val="60000"/>
+            <a:satMod val="120000"/>
+          </a:schemeClr>
+        </a:solidFill>
+        <a:solidFill>
+          <a:schemeClr val="phClr">
+            <a:shade val="75000"/>
+            <a:satMod val="160000"/>
+          </a:schemeClr>
+        </a:solidFill>
       </a:fillStyleLst>
       <a:lnStyleLst>
         <a:ln w="9525" cap="flat" cmpd="sng" algn="ctr">
-          <a:solidFill>
-            <a:schemeClr val="phClr">
-              <a:shade val="95000"/>
-              <a:satMod val="105000"/>
-            </a:schemeClr>
-          </a:solidFill>
-          <a:prstDash val="solid"/>
-        </a:ln>
-        <a:ln w="25400" cap="flat" cmpd="sng" algn="ctr">
           <a:solidFill>
             <a:schemeClr val="phClr"/>
           </a:solidFill>
           <a:prstDash val="solid"/>
         </a:ln>
-        <a:ln w="38100" cap="flat" cmpd="sng" algn="ctr">
+        <a:ln w="13970" cap="flat" cmpd="sng" algn="ctr">
           <a:solidFill>
             <a:schemeClr val="phClr"/>
+          </a:solidFill>
+          <a:prstDash val="solid"/>
+        </a:ln>
+        <a:ln w="17145" cap="flat" cmpd="sng" algn="ctr">
+          <a:solidFill>
+            <a:schemeClr val="phClr">
+              <a:shade val="95000"/>
+              <a:alpha val="95000"/>
+              <a:satMod val="150000"/>
+            </a:schemeClr>
           </a:solidFill>
           <a:prstDash val="solid"/>
         </a:ln>
       </a:lnStyleLst>
       <a:effectStyleLst>
         <a:effectStyle>
-          <a:effectLst>
-            <a:outerShdw blurRad="40000" dist="20000" dir="5400000" rotWithShape="0">
-              <a:srgbClr val="000000">
-                <a:alpha val="38000"/>
-              </a:srgbClr>
-            </a:outerShdw>
-          </a:effectLst>
+          <a:effectLst/>
         </a:effectStyle>
         <a:effectStyle>
           <a:effectLst>
-            <a:outerShdw blurRad="40000" dist="23000" dir="5400000" rotWithShape="0">
+            <a:outerShdw blurRad="50800" dist="15240" dir="5400000" algn="tl" rotWithShape="0">
               <a:srgbClr val="000000">
-                <a:alpha val="35000"/>
-              </a:srgbClr>
-            </a:outerShdw>
-          </a:effectLst>
-        </a:effectStyle>
-        <a:effectStyle>
-          <a:effectLst>
-            <a:outerShdw blurRad="40000" dist="23000" dir="5400000" rotWithShape="0">
-              <a:srgbClr val="000000">
-                <a:alpha val="35000"/>
+                <a:alpha val="75000"/>
               </a:srgbClr>
             </a:outerShdw>
           </a:effectLst>
@@ -4554,12 +5291,40 @@
             <a:camera prst="orthographicFront">
               <a:rot lat="0" lon="0" rev="0"/>
             </a:camera>
-            <a:lightRig rig="threePt" dir="t">
-              <a:rot lat="0" lon="0" rev="1200000"/>
-            </a:lightRig>
+            <a:lightRig rig="brightRoom" dir="tl"/>
           </a:scene3d>
-          <a:sp3d>
-            <a:bevelT w="63500" h="25400"/>
+          <a:sp3d contourW="9525" prstMaterial="flat">
+            <a:bevelT w="0" h="0" prst="coolSlant"/>
+            <a:contourClr>
+              <a:schemeClr val="phClr">
+                <a:shade val="35000"/>
+                <a:satMod val="130000"/>
+              </a:schemeClr>
+            </a:contourClr>
+          </a:sp3d>
+        </a:effectStyle>
+        <a:effectStyle>
+          <a:effectLst>
+            <a:outerShdw blurRad="76200" dist="25400" dir="5400000" algn="tl" rotWithShape="0">
+              <a:srgbClr val="000000">
+                <a:alpha val="55000"/>
+              </a:srgbClr>
+            </a:outerShdw>
+          </a:effectLst>
+          <a:scene3d>
+            <a:camera prst="orthographicFront">
+              <a:rot lat="0" lon="0" rev="0"/>
+            </a:camera>
+            <a:lightRig rig="brightRoom" dir="tl"/>
+          </a:scene3d>
+          <a:sp3d contourW="19050" prstMaterial="flat">
+            <a:bevelT w="0" h="0" prst="coolSlant"/>
+            <a:contourClr>
+              <a:schemeClr val="phClr">
+                <a:shade val="25000"/>
+                <a:satMod val="140000"/>
+              </a:schemeClr>
+            </a:contourClr>
           </a:sp3d>
         </a:effectStyle>
       </a:effectStyleLst>
@@ -4567,49 +5332,32 @@
         <a:solidFill>
           <a:schemeClr val="phClr"/>
         </a:solidFill>
+        <a:solidFill>
+          <a:schemeClr val="phClr">
+            <a:tint val="95000"/>
+            <a:satMod val="170000"/>
+          </a:schemeClr>
+        </a:solidFill>
         <a:gradFill rotWithShape="1">
           <a:gsLst>
             <a:gs pos="0">
               <a:schemeClr val="phClr">
-                <a:tint val="40000"/>
-                <a:satMod val="350000"/>
-              </a:schemeClr>
-            </a:gs>
-            <a:gs pos="40000">
-              <a:schemeClr val="phClr">
-                <a:tint val="45000"/>
-                <a:shade val="99000"/>
-                <a:satMod val="350000"/>
+                <a:tint val="94000"/>
+                <a:shade val="98000"/>
+                <a:satMod val="130000"/>
+                <a:lumMod val="102000"/>
               </a:schemeClr>
             </a:gs>
             <a:gs pos="100000">
               <a:schemeClr val="phClr">
-                <a:shade val="20000"/>
-                <a:satMod val="255000"/>
+                <a:tint val="98000"/>
+                <a:shade val="78000"/>
+                <a:satMod val="140000"/>
               </a:schemeClr>
             </a:gs>
           </a:gsLst>
           <a:path path="circle">
-            <a:fillToRect l="50000" t="-80000" r="50000" b="180000"/>
-          </a:path>
-        </a:gradFill>
-        <a:gradFill rotWithShape="1">
-          <a:gsLst>
-            <a:gs pos="0">
-              <a:schemeClr val="phClr">
-                <a:tint val="80000"/>
-                <a:satMod val="300000"/>
-              </a:schemeClr>
-            </a:gs>
-            <a:gs pos="100000">
-              <a:schemeClr val="phClr">
-                <a:shade val="30000"/>
-                <a:satMod val="200000"/>
-              </a:schemeClr>
-            </a:gs>
-          </a:gsLst>
-          <a:path path="circle">
-            <a:fillToRect l="50000" t="50000" r="50000" b="50000"/>
+            <a:fillToRect l="100000" t="100000" r="100000" b="100000"/>
           </a:path>
         </a:gradFill>
       </a:bgFillStyleLst>
@@ -4617,5 +5365,10 @@
   </a:themeElements>
   <a:objectDefaults/>
   <a:extraClrSchemeLst/>
+  <a:extLst>
+    <a:ext uri="{05A4C25C-085E-4340-85A3-A5531E510DB2}">
+      <thm15:themeFamily xmlns:thm15="http://schemas.microsoft.com/office/thememl/2012/main" name="View" id="{BA0EB5A6-F2D4-4F82-977B-64ADEE4A2A69}" vid="{3969A8A2-35DB-4E3B-8885-16FD20568674}"/>
+    </a:ext>
+  </a:extLst>
 </a:theme>
 </file>
</xml_diff>